<commit_message>
new:us: cleanup fist part of document
</commit_message>
<xml_diff>
--- a/docs/images/vol8-diagrams.pptx
+++ b/docs/images/vol8-diagrams.pptx
@@ -5,10 +5,11 @@
     <p:sldMasterId id="2147483660" r:id="rId1"/>
   </p:sldMasterIdLst>
   <p:notesMasterIdLst>
-    <p:notesMasterId r:id="rId3"/>
+    <p:notesMasterId r:id="rId4"/>
   </p:notesMasterIdLst>
   <p:sldIdLst>
     <p:sldId id="271" r:id="rId2"/>
+    <p:sldId id="272" r:id="rId3"/>
   </p:sldIdLst>
   <p:sldSz cx="12192000" cy="6858000"/>
   <p:notesSz cx="6858000" cy="9144000"/>
@@ -197,7 +198,7 @@
           <a:p>
             <a:fld id="{AAE983D3-B308-4231-8E6A-BD92A2915214}" type="datetimeFigureOut">
               <a:rPr lang="en-US" smtClean="0"/>
-              <a:t>2/27/17</a:t>
+              <a:t>5/28/17</a:t>
             </a:fld>
             <a:endParaRPr lang="en-US"/>
           </a:p>
@@ -602,6 +603,144 @@
 </p:notes>
 </file>
 
+<file path=ppt/notesSlides/notesSlide2.xml><?xml version="1.0" encoding="utf-8"?>
+<p:notes xmlns:a="http://schemas.openxmlformats.org/drawingml/2006/main" xmlns:r="http://schemas.openxmlformats.org/officeDocument/2006/relationships" xmlns:p="http://schemas.openxmlformats.org/presentationml/2006/main">
+  <p:cSld>
+    <p:spTree>
+      <p:nvGrpSpPr>
+        <p:cNvPr id="1" name=""/>
+        <p:cNvGrpSpPr/>
+        <p:nvPr/>
+      </p:nvGrpSpPr>
+      <p:grpSpPr>
+        <a:xfrm>
+          <a:off x="0" y="0"/>
+          <a:ext cx="0" cy="0"/>
+          <a:chOff x="0" y="0"/>
+          <a:chExt cx="0" cy="0"/>
+        </a:xfrm>
+      </p:grpSpPr>
+      <p:sp>
+        <p:nvSpPr>
+          <p:cNvPr id="2" name="Slide Image Placeholder 1"/>
+          <p:cNvSpPr>
+            <a:spLocks noGrp="1" noRot="1" noChangeAspect="1"/>
+          </p:cNvSpPr>
+          <p:nvPr>
+            <p:ph type="sldImg"/>
+          </p:nvPr>
+        </p:nvSpPr>
+        <p:spPr/>
+      </p:sp>
+      <p:sp>
+        <p:nvSpPr>
+          <p:cNvPr id="3" name="Notes Placeholder 2"/>
+          <p:cNvSpPr>
+            <a:spLocks noGrp="1"/>
+          </p:cNvSpPr>
+          <p:nvPr>
+            <p:ph type="body" idx="1"/>
+          </p:nvPr>
+        </p:nvSpPr>
+        <p:spPr/>
+        <p:txBody>
+          <a:bodyPr/>
+          <a:lstStyle/>
+          <a:p>
+            <a:endParaRPr lang="en-US" dirty="0"/>
+          </a:p>
+        </p:txBody>
+      </p:sp>
+      <p:sp>
+        <p:nvSpPr>
+          <p:cNvPr id="4" name="Slide Number Placeholder 3"/>
+          <p:cNvSpPr>
+            <a:spLocks noGrp="1"/>
+          </p:cNvSpPr>
+          <p:nvPr>
+            <p:ph type="sldNum" sz="quarter" idx="10"/>
+          </p:nvPr>
+        </p:nvSpPr>
+        <p:spPr/>
+        <p:txBody>
+          <a:bodyPr/>
+          <a:lstStyle/>
+          <a:p>
+            <a:pPr marL="0" marR="0" lvl="0" indent="0" defTabSz="914400" eaLnBrk="1" fontAlgn="auto" latinLnBrk="0" hangingPunct="1">
+              <a:lnSpc>
+                <a:spcPct val="100000"/>
+              </a:lnSpc>
+              <a:spcBef>
+                <a:spcPts val="0"/>
+              </a:spcBef>
+              <a:spcAft>
+                <a:spcPts val="0"/>
+              </a:spcAft>
+              <a:buClrTx/>
+              <a:buSzTx/>
+              <a:buFontTx/>
+              <a:buNone/>
+              <a:tabLst/>
+              <a:defRPr/>
+            </a:pPr>
+            <a:fld id="{D42F9DD9-F15F-4ED0-8703-BC948C7FC984}" type="slidenum">
+              <a:rPr kumimoji="0" lang="en-US" sz="1800" b="0" i="0" u="none" strike="noStrike" kern="0" cap="none" spc="0" normalizeH="0" baseline="0" noProof="0" smtClean="0">
+                <a:ln>
+                  <a:noFill/>
+                </a:ln>
+                <a:solidFill>
+                  <a:sysClr val="windowText" lastClr="000000"/>
+                </a:solidFill>
+                <a:effectLst/>
+                <a:uLnTx/>
+                <a:uFillTx/>
+              </a:rPr>
+              <a:pPr marL="0" marR="0" lvl="0" indent="0" defTabSz="914400" eaLnBrk="1" fontAlgn="auto" latinLnBrk="0" hangingPunct="1">
+                <a:lnSpc>
+                  <a:spcPct val="100000"/>
+                </a:lnSpc>
+                <a:spcBef>
+                  <a:spcPts val="0"/>
+                </a:spcBef>
+                <a:spcAft>
+                  <a:spcPts val="0"/>
+                </a:spcAft>
+                <a:buClrTx/>
+                <a:buSzTx/>
+                <a:buFontTx/>
+                <a:buNone/>
+                <a:tabLst/>
+                <a:defRPr/>
+              </a:pPr>
+              <a:t>2</a:t>
+            </a:fld>
+            <a:endParaRPr kumimoji="0" lang="en-US" sz="1800" b="0" i="0" u="none" strike="noStrike" kern="0" cap="none" spc="0" normalizeH="0" baseline="0" noProof="0">
+              <a:ln>
+                <a:noFill/>
+              </a:ln>
+              <a:solidFill>
+                <a:sysClr val="windowText" lastClr="000000"/>
+              </a:solidFill>
+              <a:effectLst/>
+              <a:uLnTx/>
+              <a:uFillTx/>
+            </a:endParaRPr>
+          </a:p>
+        </p:txBody>
+      </p:sp>
+    </p:spTree>
+    <p:extLst>
+      <p:ext uri="{BB962C8B-B14F-4D97-AF65-F5344CB8AC3E}">
+        <p14:creationId xmlns:p14="http://schemas.microsoft.com/office/powerpoint/2010/main" val="584273904"/>
+      </p:ext>
+    </p:extLst>
+  </p:cSld>
+  <p:clrMapOvr>
+    <a:masterClrMapping/>
+  </p:clrMapOvr>
+</p:notes>
+</file>
+
 <file path=ppt/slideLayouts/slideLayout1.xml><?xml version="1.0" encoding="utf-8"?>
 <p:sldLayout xmlns:a="http://schemas.openxmlformats.org/drawingml/2006/main" xmlns:r="http://schemas.openxmlformats.org/officeDocument/2006/relationships" xmlns:p="http://schemas.openxmlformats.org/presentationml/2006/main" type="title" preserve="1">
   <p:cSld name="Title Slide">
@@ -782,7 +921,7 @@
             <a:fld id="{F4D1979D-B802-493A-A274-CCFCA55ED98F}" type="datetimeFigureOut">
               <a:rPr lang="en-US" smtClean="0"/>
               <a:pPr/>
-              <a:t>2/27/17</a:t>
+              <a:t>5/28/17</a:t>
             </a:fld>
             <a:endParaRPr lang="en-US"/>
           </a:p>
@@ -952,7 +1091,7 @@
             <a:fld id="{F4D1979D-B802-493A-A274-CCFCA55ED98F}" type="datetimeFigureOut">
               <a:rPr lang="en-US" smtClean="0"/>
               <a:pPr/>
-              <a:t>2/27/17</a:t>
+              <a:t>5/28/17</a:t>
             </a:fld>
             <a:endParaRPr lang="en-US"/>
           </a:p>
@@ -1132,7 +1271,7 @@
             <a:fld id="{F4D1979D-B802-493A-A274-CCFCA55ED98F}" type="datetimeFigureOut">
               <a:rPr lang="en-US" smtClean="0"/>
               <a:pPr/>
-              <a:t>2/27/17</a:t>
+              <a:t>5/28/17</a:t>
             </a:fld>
             <a:endParaRPr lang="en-US"/>
           </a:p>
@@ -1302,7 +1441,7 @@
             <a:fld id="{F4D1979D-B802-493A-A274-CCFCA55ED98F}" type="datetimeFigureOut">
               <a:rPr lang="en-US" smtClean="0"/>
               <a:pPr/>
-              <a:t>2/27/17</a:t>
+              <a:t>5/28/17</a:t>
             </a:fld>
             <a:endParaRPr lang="en-US"/>
           </a:p>
@@ -1549,7 +1688,7 @@
             <a:fld id="{F4D1979D-B802-493A-A274-CCFCA55ED98F}" type="datetimeFigureOut">
               <a:rPr lang="en-US" smtClean="0"/>
               <a:pPr/>
-              <a:t>2/27/17</a:t>
+              <a:t>5/28/17</a:t>
             </a:fld>
             <a:endParaRPr lang="en-US"/>
           </a:p>
@@ -1836,7 +1975,7 @@
             <a:fld id="{F4D1979D-B802-493A-A274-CCFCA55ED98F}" type="datetimeFigureOut">
               <a:rPr lang="en-US" smtClean="0"/>
               <a:pPr/>
-              <a:t>2/27/17</a:t>
+              <a:t>5/28/17</a:t>
             </a:fld>
             <a:endParaRPr lang="en-US"/>
           </a:p>
@@ -2257,7 +2396,7 @@
             <a:fld id="{F4D1979D-B802-493A-A274-CCFCA55ED98F}" type="datetimeFigureOut">
               <a:rPr lang="en-US" smtClean="0"/>
               <a:pPr/>
-              <a:t>2/27/17</a:t>
+              <a:t>5/28/17</a:t>
             </a:fld>
             <a:endParaRPr lang="en-US"/>
           </a:p>
@@ -2376,7 +2515,7 @@
             <a:fld id="{F4D1979D-B802-493A-A274-CCFCA55ED98F}" type="datetimeFigureOut">
               <a:rPr lang="en-US" smtClean="0"/>
               <a:pPr/>
-              <a:t>2/27/17</a:t>
+              <a:t>5/28/17</a:t>
             </a:fld>
             <a:endParaRPr lang="en-US"/>
           </a:p>
@@ -2473,7 +2612,7 @@
             <a:fld id="{F4D1979D-B802-493A-A274-CCFCA55ED98F}" type="datetimeFigureOut">
               <a:rPr lang="en-US" smtClean="0"/>
               <a:pPr/>
-              <a:t>2/27/17</a:t>
+              <a:t>5/28/17</a:t>
             </a:fld>
             <a:endParaRPr lang="en-US"/>
           </a:p>
@@ -2750,7 +2889,7 @@
             <a:fld id="{F4D1979D-B802-493A-A274-CCFCA55ED98F}" type="datetimeFigureOut">
               <a:rPr lang="en-US" smtClean="0"/>
               <a:pPr/>
-              <a:t>2/27/17</a:t>
+              <a:t>5/28/17</a:t>
             </a:fld>
             <a:endParaRPr lang="en-US"/>
           </a:p>
@@ -3004,7 +3143,7 @@
             <a:fld id="{F4D1979D-B802-493A-A274-CCFCA55ED98F}" type="datetimeFigureOut">
               <a:rPr lang="en-US" smtClean="0"/>
               <a:pPr/>
-              <a:t>2/27/17</a:t>
+              <a:t>5/28/17</a:t>
             </a:fld>
             <a:endParaRPr lang="en-US"/>
           </a:p>
@@ -3217,7 +3356,7 @@
             <a:fld id="{F4D1979D-B802-493A-A274-CCFCA55ED98F}" type="datetimeFigureOut">
               <a:rPr lang="en-US" smtClean="0"/>
               <a:pPr/>
-              <a:t>2/27/17</a:t>
+              <a:t>5/28/17</a:t>
             </a:fld>
             <a:endParaRPr lang="en-US"/>
           </a:p>
@@ -4558,6 +4697,7 @@
             <a:avLst/>
           </a:prstGeom>
           <a:noFill/>
+          <a:effectLst/>
         </p:spPr>
         <p:txBody>
           <a:bodyPr wrap="square" rtlCol="0">
@@ -4566,11 +4706,7 @@
           <a:lstStyle/>
           <a:p>
             <a:r>
-              <a:rPr lang="en-US" sz="1600" b="1" kern="0" spc="300" dirty="0">
-                <a:solidFill>
-                  <a:schemeClr val="bg1"/>
-                </a:solidFill>
-              </a:rPr>
+              <a:rPr lang="en-US" sz="1600" b="1" kern="0" spc="300" dirty="0"/>
               <a:t>Security &amp; Privacy</a:t>
             </a:r>
           </a:p>
@@ -4591,6 +4727,7 @@
             <a:avLst/>
           </a:prstGeom>
           <a:noFill/>
+          <a:effectLst/>
         </p:spPr>
         <p:txBody>
           <a:bodyPr wrap="square" rtlCol="0">
@@ -4599,11 +4736,7 @@
           <a:lstStyle/>
           <a:p>
             <a:r>
-              <a:rPr lang="en-US" sz="1600" b="1" kern="0" spc="300" dirty="0">
-                <a:solidFill>
-                  <a:schemeClr val="bg1"/>
-                </a:solidFill>
-              </a:rPr>
+              <a:rPr lang="en-US" sz="1600" b="1" kern="0" spc="300" dirty="0"/>
               <a:t>Management</a:t>
             </a:r>
           </a:p>
@@ -4945,8 +5078,8 @@
         </p:nvSpPr>
         <p:spPr>
           <a:xfrm>
-            <a:off x="3701567" y="76200"/>
-            <a:ext cx="3848694" cy="369332"/>
+            <a:off x="2447039" y="76199"/>
+            <a:ext cx="6374862" cy="378271"/>
           </a:xfrm>
           <a:prstGeom prst="rect">
             <a:avLst/>
@@ -4959,11 +5092,9 @@
           </a:bodyPr>
           <a:lstStyle/>
           <a:p>
+            <a:pPr algn="ctr"/>
             <a:r>
               <a:rPr lang="en-US" b="1" kern="0" spc="300" dirty="0">
-                <a:solidFill>
-                  <a:schemeClr val="bg1"/>
-                </a:solidFill>
                 <a:effectLst>
                   <a:outerShdw blurRad="38100" dist="38100" dir="2700000" algn="tl">
                     <a:srgbClr val="000000">
@@ -4972,7 +5103,23 @@
                   </a:outerShdw>
                 </a:effectLst>
               </a:rPr>
-              <a:t>INFORMATION VALUE CHAIN</a:t>
+              <a:t>INFORMATION </a:t>
+            </a:r>
+            <a:r>
+              <a:rPr lang="en-US" b="1" kern="0" spc="300" dirty="0"/>
+              <a:t>VALUE</a:t>
+            </a:r>
+            <a:r>
+              <a:rPr lang="en-US" b="1" kern="0" spc="300" dirty="0">
+                <a:effectLst>
+                  <a:outerShdw blurRad="38100" dist="38100" dir="2700000" algn="tl">
+                    <a:srgbClr val="000000">
+                      <a:alpha val="43137"/>
+                    </a:srgbClr>
+                  </a:outerShdw>
+                </a:effectLst>
+              </a:rPr>
+              <a:t> CHAIN</a:t>
             </a:r>
           </a:p>
         </p:txBody>
@@ -4985,13 +5132,14 @@
         </p:nvSpPr>
         <p:spPr>
           <a:xfrm rot="16200000">
-            <a:off x="9061507" y="3298290"/>
-            <a:ext cx="2393912" cy="369332"/>
+            <a:off x="8304014" y="3145111"/>
+            <a:ext cx="3964853" cy="369332"/>
           </a:xfrm>
           <a:prstGeom prst="rect">
             <a:avLst/>
           </a:prstGeom>
           <a:noFill/>
+          <a:effectLst/>
         </p:spPr>
         <p:txBody>
           <a:bodyPr wrap="square" rtlCol="0">
@@ -4999,11 +5147,9 @@
           </a:bodyPr>
           <a:lstStyle/>
           <a:p>
+            <a:pPr algn="ctr"/>
             <a:r>
               <a:rPr lang="en-US" b="1" kern="0" spc="300" dirty="0">
-                <a:solidFill>
-                  <a:schemeClr val="bg1"/>
-                </a:solidFill>
                 <a:effectLst>
                   <a:outerShdw blurRad="38100" dist="38100" dir="2700000" algn="tl">
                     <a:srgbClr val="000000">
@@ -7046,6 +7192,3466 @@
     <p:extLst>
       <p:ext uri="{BB962C8B-B14F-4D97-AF65-F5344CB8AC3E}">
         <p14:creationId xmlns:p14="http://schemas.microsoft.com/office/powerpoint/2010/main" val="2590391242"/>
+      </p:ext>
+    </p:extLst>
+  </p:cSld>
+  <p:clrMapOvr>
+    <a:masterClrMapping/>
+  </p:clrMapOvr>
+</p:sld>
+</file>
+
+<file path=ppt/slides/slide2.xml><?xml version="1.0" encoding="utf-8"?>
+<p:sld xmlns:a="http://schemas.openxmlformats.org/drawingml/2006/main" xmlns:r="http://schemas.openxmlformats.org/officeDocument/2006/relationships" xmlns:p="http://schemas.openxmlformats.org/presentationml/2006/main">
+  <p:cSld>
+    <p:spTree>
+      <p:nvGrpSpPr>
+        <p:cNvPr id="1" name=""/>
+        <p:cNvGrpSpPr/>
+        <p:nvPr/>
+      </p:nvGrpSpPr>
+      <p:grpSpPr>
+        <a:xfrm>
+          <a:off x="0" y="0"/>
+          <a:ext cx="0" cy="0"/>
+          <a:chOff x="0" y="0"/>
+          <a:chExt cx="0" cy="0"/>
+        </a:xfrm>
+      </p:grpSpPr>
+      <p:sp>
+        <p:nvSpPr>
+          <p:cNvPr id="175" name="Chevron 174"/>
+          <p:cNvSpPr/>
+          <p:nvPr/>
+        </p:nvSpPr>
+        <p:spPr>
+          <a:xfrm>
+            <a:off x="1905001" y="110996"/>
+            <a:ext cx="7696199" cy="270004"/>
+          </a:xfrm>
+          <a:prstGeom prst="chevron">
+            <a:avLst/>
+          </a:prstGeom>
+          <a:solidFill>
+            <a:schemeClr val="accent6"/>
+          </a:solidFill>
+          <a:ln>
+            <a:noFill/>
+          </a:ln>
+        </p:spPr>
+        <p:style>
+          <a:lnRef idx="2">
+            <a:schemeClr val="accent1">
+              <a:shade val="50000"/>
+            </a:schemeClr>
+          </a:lnRef>
+          <a:fillRef idx="1">
+            <a:schemeClr val="accent1"/>
+          </a:fillRef>
+          <a:effectRef idx="0">
+            <a:schemeClr val="accent1"/>
+          </a:effectRef>
+          <a:fontRef idx="minor">
+            <a:schemeClr val="lt1"/>
+          </a:fontRef>
+        </p:style>
+        <p:txBody>
+          <a:bodyPr rtlCol="0" anchor="ctr"/>
+          <a:lstStyle/>
+          <a:p>
+            <a:pPr algn="ctr"/>
+            <a:endParaRPr lang="en-US" kern="0" dirty="0">
+              <a:solidFill>
+                <a:schemeClr val="tx1"/>
+              </a:solidFill>
+            </a:endParaRPr>
+          </a:p>
+        </p:txBody>
+      </p:sp>
+      <p:sp>
+        <p:nvSpPr>
+          <p:cNvPr id="75" name="Rounded Rectangle 74"/>
+          <p:cNvSpPr/>
+          <p:nvPr/>
+        </p:nvSpPr>
+        <p:spPr>
+          <a:xfrm rot="16200000">
+            <a:off x="3162301" y="-647701"/>
+            <a:ext cx="5410201" cy="8077200"/>
+          </a:xfrm>
+          <a:prstGeom prst="roundRect">
+            <a:avLst/>
+          </a:prstGeom>
+          <a:solidFill>
+            <a:schemeClr val="bg2">
+              <a:lumMod val="75000"/>
+            </a:schemeClr>
+          </a:solidFill>
+          <a:ln>
+            <a:noFill/>
+            <a:prstDash val="dash"/>
+          </a:ln>
+          <a:effectLst>
+            <a:outerShdw blurRad="228600" dist="38100" dir="19320000" algn="bl" rotWithShape="0">
+              <a:schemeClr val="bg2">
+                <a:lumMod val="25000"/>
+                <a:alpha val="40000"/>
+              </a:schemeClr>
+            </a:outerShdw>
+          </a:effectLst>
+        </p:spPr>
+        <p:style>
+          <a:lnRef idx="2">
+            <a:schemeClr val="accent1">
+              <a:shade val="50000"/>
+            </a:schemeClr>
+          </a:lnRef>
+          <a:fillRef idx="1">
+            <a:schemeClr val="accent1"/>
+          </a:fillRef>
+          <a:effectRef idx="0">
+            <a:schemeClr val="accent1"/>
+          </a:effectRef>
+          <a:fontRef idx="minor">
+            <a:schemeClr val="lt1"/>
+          </a:fontRef>
+        </p:style>
+        <p:txBody>
+          <a:bodyPr rtlCol="0" anchor="ctr"/>
+          <a:lstStyle/>
+          <a:p>
+            <a:endParaRPr lang="en-US" sz="1600" b="1" kern="0" spc="300" dirty="0">
+              <a:solidFill>
+                <a:schemeClr val="bg1"/>
+              </a:solidFill>
+            </a:endParaRPr>
+          </a:p>
+        </p:txBody>
+      </p:sp>
+      <p:sp>
+        <p:nvSpPr>
+          <p:cNvPr id="76" name="Rounded Rectangle 75"/>
+          <p:cNvSpPr/>
+          <p:nvPr/>
+        </p:nvSpPr>
+        <p:spPr>
+          <a:xfrm rot="16200000">
+            <a:off x="2962880" y="-770921"/>
+            <a:ext cx="5410200" cy="8018842"/>
+          </a:xfrm>
+          <a:prstGeom prst="roundRect">
+            <a:avLst/>
+          </a:prstGeom>
+          <a:solidFill>
+            <a:schemeClr val="accent1">
+              <a:lumMod val="40000"/>
+              <a:lumOff val="60000"/>
+              <a:alpha val="51000"/>
+            </a:schemeClr>
+          </a:solidFill>
+          <a:ln>
+            <a:noFill/>
+            <a:prstDash val="dash"/>
+          </a:ln>
+          <a:effectLst>
+            <a:outerShdw blurRad="228600" dist="38100" dir="19320000" algn="bl" rotWithShape="0">
+              <a:schemeClr val="accent1">
+                <a:lumMod val="50000"/>
+                <a:alpha val="40000"/>
+              </a:schemeClr>
+            </a:outerShdw>
+          </a:effectLst>
+        </p:spPr>
+        <p:style>
+          <a:lnRef idx="2">
+            <a:schemeClr val="accent1">
+              <a:shade val="50000"/>
+            </a:schemeClr>
+          </a:lnRef>
+          <a:fillRef idx="1">
+            <a:schemeClr val="accent1"/>
+          </a:fillRef>
+          <a:effectRef idx="0">
+            <a:schemeClr val="accent1"/>
+          </a:effectRef>
+          <a:fontRef idx="minor">
+            <a:schemeClr val="lt1"/>
+          </a:fontRef>
+        </p:style>
+        <p:txBody>
+          <a:bodyPr rtlCol="0" anchor="ctr"/>
+          <a:lstStyle/>
+          <a:p>
+            <a:endParaRPr lang="en-US" sz="1600" b="1" kern="0" spc="300" dirty="0">
+              <a:solidFill>
+                <a:schemeClr val="bg1"/>
+              </a:solidFill>
+            </a:endParaRPr>
+          </a:p>
+        </p:txBody>
+      </p:sp>
+      <p:sp>
+        <p:nvSpPr>
+          <p:cNvPr id="68" name="TextBox 67"/>
+          <p:cNvSpPr txBox="1"/>
+          <p:nvPr/>
+        </p:nvSpPr>
+        <p:spPr>
+          <a:xfrm>
+            <a:off x="1682480" y="6276780"/>
+            <a:ext cx="1060720" cy="338554"/>
+          </a:xfrm>
+          <a:prstGeom prst="rect">
+            <a:avLst/>
+          </a:prstGeom>
+          <a:noFill/>
+        </p:spPr>
+        <p:txBody>
+          <a:bodyPr wrap="square" rtlCol="0">
+            <a:spAutoFit/>
+          </a:bodyPr>
+          <a:lstStyle/>
+          <a:p>
+            <a:r>
+              <a:rPr lang="en-US" sz="1600" b="1" kern="0" dirty="0">
+                <a:solidFill>
+                  <a:srgbClr val="002060"/>
+                </a:solidFill>
+                <a:effectLst>
+                  <a:outerShdw blurRad="38100" dist="38100" dir="2700000" algn="tl">
+                    <a:srgbClr val="000000">
+                      <a:alpha val="43137"/>
+                    </a:srgbClr>
+                  </a:outerShdw>
+                </a:effectLst>
+              </a:rPr>
+              <a:t>K E Y :</a:t>
+            </a:r>
+          </a:p>
+        </p:txBody>
+      </p:sp>
+      <p:sp>
+        <p:nvSpPr>
+          <p:cNvPr id="72" name="Rectangle 71"/>
+          <p:cNvSpPr/>
+          <p:nvPr/>
+        </p:nvSpPr>
+        <p:spPr>
+          <a:xfrm>
+            <a:off x="1658560" y="6322339"/>
+            <a:ext cx="8780844" cy="431136"/>
+          </a:xfrm>
+          <a:prstGeom prst="rect">
+            <a:avLst/>
+          </a:prstGeom>
+          <a:noFill/>
+          <a:ln>
+            <a:solidFill>
+              <a:schemeClr val="tx2"/>
+            </a:solidFill>
+          </a:ln>
+        </p:spPr>
+        <p:style>
+          <a:lnRef idx="2">
+            <a:schemeClr val="accent1">
+              <a:shade val="50000"/>
+            </a:schemeClr>
+          </a:lnRef>
+          <a:fillRef idx="1">
+            <a:schemeClr val="accent1"/>
+          </a:fillRef>
+          <a:effectRef idx="0">
+            <a:schemeClr val="accent1"/>
+          </a:effectRef>
+          <a:fontRef idx="minor">
+            <a:schemeClr val="lt1"/>
+          </a:fontRef>
+        </p:style>
+        <p:txBody>
+          <a:bodyPr rtlCol="0" anchor="ctr"/>
+          <a:lstStyle/>
+          <a:p>
+            <a:pPr algn="ctr"/>
+            <a:endParaRPr lang="en-US" kern="0">
+              <a:solidFill>
+                <a:sysClr val="windowText" lastClr="000000"/>
+              </a:solidFill>
+            </a:endParaRPr>
+          </a:p>
+        </p:txBody>
+      </p:sp>
+      <p:sp>
+        <p:nvSpPr>
+          <p:cNvPr id="86" name="Right Arrow 85"/>
+          <p:cNvSpPr/>
+          <p:nvPr/>
+        </p:nvSpPr>
+        <p:spPr>
+          <a:xfrm>
+            <a:off x="7584847" y="6334026"/>
+            <a:ext cx="913073" cy="338201"/>
+          </a:xfrm>
+          <a:prstGeom prst="rightArrow">
+            <a:avLst/>
+          </a:prstGeom>
+          <a:solidFill>
+            <a:srgbClr val="FF0000"/>
+          </a:solidFill>
+          <a:ln>
+            <a:noFill/>
+          </a:ln>
+          <a:effectLst>
+            <a:outerShdw blurRad="50800" dist="38100" dir="2700000" algn="tl" rotWithShape="0">
+              <a:prstClr val="black">
+                <a:alpha val="40000"/>
+              </a:prstClr>
+            </a:outerShdw>
+          </a:effectLst>
+        </p:spPr>
+        <p:style>
+          <a:lnRef idx="2">
+            <a:schemeClr val="accent1">
+              <a:shade val="50000"/>
+            </a:schemeClr>
+          </a:lnRef>
+          <a:fillRef idx="1">
+            <a:schemeClr val="accent1"/>
+          </a:fillRef>
+          <a:effectRef idx="0">
+            <a:schemeClr val="accent1"/>
+          </a:effectRef>
+          <a:fontRef idx="minor">
+            <a:schemeClr val="lt1"/>
+          </a:fontRef>
+        </p:style>
+        <p:txBody>
+          <a:bodyPr rtlCol="0" anchor="ctr"/>
+          <a:lstStyle/>
+          <a:p>
+            <a:pPr algn="ctr"/>
+            <a:r>
+              <a:rPr lang="en-US" sz="1400" b="1" kern="0" dirty="0">
+                <a:solidFill>
+                  <a:sysClr val="windowText" lastClr="000000"/>
+                </a:solidFill>
+              </a:rPr>
+              <a:t>SW</a:t>
+            </a:r>
+          </a:p>
+        </p:txBody>
+      </p:sp>
+      <p:cxnSp>
+        <p:nvCxnSpPr>
+          <p:cNvPr id="87" name="Straight Arrow Connector 86"/>
+          <p:cNvCxnSpPr>
+            <a:endCxn id="92" idx="1"/>
+          </p:cNvCxnSpPr>
+          <p:nvPr/>
+        </p:nvCxnSpPr>
+        <p:spPr>
+          <a:xfrm>
+            <a:off x="5334000" y="6507872"/>
+            <a:ext cx="975688" cy="11991"/>
+          </a:xfrm>
+          <a:prstGeom prst="straightConnector1">
+            <a:avLst/>
+          </a:prstGeom>
+          <a:ln w="73025">
+            <a:solidFill>
+              <a:srgbClr val="006600"/>
+            </a:solidFill>
+            <a:tailEnd type="triangle"/>
+          </a:ln>
+        </p:spPr>
+        <p:style>
+          <a:lnRef idx="1">
+            <a:schemeClr val="accent1"/>
+          </a:lnRef>
+          <a:fillRef idx="0">
+            <a:schemeClr val="accent1"/>
+          </a:fillRef>
+          <a:effectRef idx="0">
+            <a:schemeClr val="accent1"/>
+          </a:effectRef>
+          <a:fontRef idx="minor">
+            <a:schemeClr val="tx1"/>
+          </a:fontRef>
+        </p:style>
+      </p:cxnSp>
+      <p:sp>
+        <p:nvSpPr>
+          <p:cNvPr id="92" name="TextBox 91"/>
+          <p:cNvSpPr txBox="1"/>
+          <p:nvPr/>
+        </p:nvSpPr>
+        <p:spPr>
+          <a:xfrm>
+            <a:off x="6309689" y="6381363"/>
+            <a:ext cx="1399523" cy="276999"/>
+          </a:xfrm>
+          <a:prstGeom prst="rect">
+            <a:avLst/>
+          </a:prstGeom>
+          <a:noFill/>
+        </p:spPr>
+        <p:txBody>
+          <a:bodyPr wrap="square" rtlCol="0">
+            <a:spAutoFit/>
+          </a:bodyPr>
+          <a:lstStyle/>
+          <a:p>
+            <a:r>
+              <a:rPr lang="en-US" sz="1200" b="1" kern="0" dirty="0">
+                <a:solidFill>
+                  <a:srgbClr val="002060"/>
+                </a:solidFill>
+              </a:rPr>
+              <a:t>Service Use</a:t>
+            </a:r>
+          </a:p>
+        </p:txBody>
+      </p:sp>
+      <p:sp>
+        <p:nvSpPr>
+          <p:cNvPr id="93" name="TextBox 92"/>
+          <p:cNvSpPr txBox="1"/>
+          <p:nvPr/>
+        </p:nvSpPr>
+        <p:spPr>
+          <a:xfrm>
+            <a:off x="3537530" y="6312286"/>
+            <a:ext cx="1644071" cy="461665"/>
+          </a:xfrm>
+          <a:prstGeom prst="rect">
+            <a:avLst/>
+          </a:prstGeom>
+          <a:noFill/>
+        </p:spPr>
+        <p:txBody>
+          <a:bodyPr wrap="square" rtlCol="0">
+            <a:spAutoFit/>
+          </a:bodyPr>
+          <a:lstStyle/>
+          <a:p>
+            <a:r>
+              <a:rPr lang="en-US" sz="1200" b="1" kern="0" dirty="0">
+                <a:solidFill>
+                  <a:srgbClr val="002060"/>
+                </a:solidFill>
+              </a:rPr>
+              <a:t>Big Data Information Flow</a:t>
+            </a:r>
+          </a:p>
+        </p:txBody>
+      </p:sp>
+      <p:sp>
+        <p:nvSpPr>
+          <p:cNvPr id="97" name="TextBox 96"/>
+          <p:cNvSpPr txBox="1"/>
+          <p:nvPr/>
+        </p:nvSpPr>
+        <p:spPr>
+          <a:xfrm>
+            <a:off x="8485619" y="6320136"/>
+            <a:ext cx="1830538" cy="461665"/>
+          </a:xfrm>
+          <a:prstGeom prst="rect">
+            <a:avLst/>
+          </a:prstGeom>
+          <a:noFill/>
+        </p:spPr>
+        <p:txBody>
+          <a:bodyPr wrap="square" rtlCol="0">
+            <a:spAutoFit/>
+          </a:bodyPr>
+          <a:lstStyle/>
+          <a:p>
+            <a:r>
+              <a:rPr lang="en-US" sz="1200" b="1" kern="0" dirty="0">
+                <a:solidFill>
+                  <a:srgbClr val="002060"/>
+                </a:solidFill>
+              </a:rPr>
+              <a:t>Software Tools and Algorithms Transfer</a:t>
+            </a:r>
+          </a:p>
+        </p:txBody>
+      </p:sp>
+      <p:sp>
+        <p:nvSpPr>
+          <p:cNvPr id="109" name="Rounded Rectangle 108"/>
+          <p:cNvSpPr/>
+          <p:nvPr/>
+        </p:nvSpPr>
+        <p:spPr>
+          <a:xfrm flipH="1">
+            <a:off x="2925681" y="1347352"/>
+            <a:ext cx="5608716" cy="1282313"/>
+          </a:xfrm>
+          <a:prstGeom prst="roundRect">
+            <a:avLst>
+              <a:gd name="adj" fmla="val 5649"/>
+            </a:avLst>
+          </a:prstGeom>
+          <a:solidFill>
+            <a:schemeClr val="bg1">
+              <a:lumMod val="65000"/>
+            </a:schemeClr>
+          </a:solidFill>
+          <a:ln>
+            <a:noFill/>
+          </a:ln>
+          <a:effectLst>
+            <a:innerShdw blurRad="114300">
+              <a:prstClr val="black"/>
+            </a:innerShdw>
+          </a:effectLst>
+        </p:spPr>
+        <p:style>
+          <a:lnRef idx="2">
+            <a:schemeClr val="accent1">
+              <a:shade val="50000"/>
+            </a:schemeClr>
+          </a:lnRef>
+          <a:fillRef idx="1">
+            <a:schemeClr val="accent1"/>
+          </a:fillRef>
+          <a:effectRef idx="0">
+            <a:schemeClr val="accent1"/>
+          </a:effectRef>
+          <a:fontRef idx="minor">
+            <a:schemeClr val="lt1"/>
+          </a:fontRef>
+        </p:style>
+        <p:txBody>
+          <a:bodyPr rtlCol="0" anchor="ctr"/>
+          <a:lstStyle/>
+          <a:p>
+            <a:pPr algn="ctr"/>
+            <a:endParaRPr lang="en-US" kern="0">
+              <a:solidFill>
+                <a:sysClr val="windowText" lastClr="000000"/>
+              </a:solidFill>
+            </a:endParaRPr>
+          </a:p>
+        </p:txBody>
+      </p:sp>
+      <p:sp>
+        <p:nvSpPr>
+          <p:cNvPr id="110" name="TextBox 109"/>
+          <p:cNvSpPr txBox="1"/>
+          <p:nvPr/>
+        </p:nvSpPr>
+        <p:spPr>
+          <a:xfrm>
+            <a:off x="2949963" y="1295402"/>
+            <a:ext cx="5525907" cy="307777"/>
+          </a:xfrm>
+          <a:prstGeom prst="rect">
+            <a:avLst/>
+          </a:prstGeom>
+          <a:noFill/>
+        </p:spPr>
+        <p:txBody>
+          <a:bodyPr wrap="square" rtlCol="0">
+            <a:spAutoFit/>
+          </a:bodyPr>
+          <a:lstStyle/>
+          <a:p>
+            <a:r>
+              <a:rPr lang="en-US" sz="1400" b="1" kern="0" dirty="0" smtClean="0">
+                <a:solidFill>
+                  <a:sysClr val="windowText" lastClr="000000"/>
+                </a:solidFill>
+              </a:rPr>
+              <a:t>Big </a:t>
+            </a:r>
+            <a:r>
+              <a:rPr lang="en-US" sz="1400" b="1" kern="0" dirty="0">
+                <a:solidFill>
+                  <a:sysClr val="windowText" lastClr="000000"/>
+                </a:solidFill>
+              </a:rPr>
+              <a:t>Data Application Provider</a:t>
+            </a:r>
+          </a:p>
+        </p:txBody>
+      </p:sp>
+      <p:sp>
+        <p:nvSpPr>
+          <p:cNvPr id="111" name="Rounded Rectangle 110"/>
+          <p:cNvSpPr/>
+          <p:nvPr/>
+        </p:nvSpPr>
+        <p:spPr>
+          <a:xfrm flipH="1">
+            <a:off x="6400799" y="1922775"/>
+            <a:ext cx="1033677" cy="576092"/>
+          </a:xfrm>
+          <a:prstGeom prst="roundRect">
+            <a:avLst/>
+          </a:prstGeom>
+          <a:solidFill>
+            <a:schemeClr val="accent4">
+              <a:lumMod val="20000"/>
+              <a:lumOff val="80000"/>
+            </a:schemeClr>
+          </a:solidFill>
+          <a:ln>
+            <a:noFill/>
+          </a:ln>
+          <a:effectLst>
+            <a:outerShdw blurRad="50800" dist="38100" dir="2700000" algn="tl" rotWithShape="0">
+              <a:prstClr val="black">
+                <a:alpha val="40000"/>
+              </a:prstClr>
+            </a:outerShdw>
+          </a:effectLst>
+        </p:spPr>
+        <p:style>
+          <a:lnRef idx="2">
+            <a:schemeClr val="accent1">
+              <a:shade val="50000"/>
+            </a:schemeClr>
+          </a:lnRef>
+          <a:fillRef idx="1">
+            <a:schemeClr val="accent1"/>
+          </a:fillRef>
+          <a:effectRef idx="0">
+            <a:schemeClr val="accent1"/>
+          </a:effectRef>
+          <a:fontRef idx="minor">
+            <a:schemeClr val="lt1"/>
+          </a:fontRef>
+        </p:style>
+        <p:txBody>
+          <a:bodyPr lIns="0" rIns="0" rtlCol="0" anchor="b" anchorCtr="1"/>
+          <a:lstStyle/>
+          <a:p>
+            <a:pPr algn="r"/>
+            <a:r>
+              <a:rPr lang="en-US" sz="1400" b="1" kern="0" dirty="0">
+                <a:solidFill>
+                  <a:schemeClr val="tx1"/>
+                </a:solidFill>
+              </a:rPr>
+              <a:t>Visualization</a:t>
+            </a:r>
+          </a:p>
+        </p:txBody>
+      </p:sp>
+      <p:sp>
+        <p:nvSpPr>
+          <p:cNvPr id="113" name="Rounded Rectangle 112"/>
+          <p:cNvSpPr/>
+          <p:nvPr/>
+        </p:nvSpPr>
+        <p:spPr>
+          <a:xfrm>
+            <a:off x="7574466" y="2221515"/>
+            <a:ext cx="883734" cy="285830"/>
+          </a:xfrm>
+          <a:prstGeom prst="roundRect">
+            <a:avLst/>
+          </a:prstGeom>
+          <a:solidFill>
+            <a:schemeClr val="accent4">
+              <a:lumMod val="20000"/>
+              <a:lumOff val="80000"/>
+            </a:schemeClr>
+          </a:solidFill>
+          <a:ln>
+            <a:noFill/>
+          </a:ln>
+          <a:effectLst>
+            <a:outerShdw blurRad="50800" dist="38100" dir="2700000" algn="tl" rotWithShape="0">
+              <a:prstClr val="black">
+                <a:alpha val="40000"/>
+              </a:prstClr>
+            </a:outerShdw>
+          </a:effectLst>
+        </p:spPr>
+        <p:style>
+          <a:lnRef idx="2">
+            <a:schemeClr val="accent1">
+              <a:shade val="50000"/>
+            </a:schemeClr>
+          </a:lnRef>
+          <a:fillRef idx="1">
+            <a:schemeClr val="accent1"/>
+          </a:fillRef>
+          <a:effectRef idx="0">
+            <a:schemeClr val="accent1"/>
+          </a:effectRef>
+          <a:fontRef idx="minor">
+            <a:schemeClr val="lt1"/>
+          </a:fontRef>
+        </p:style>
+        <p:txBody>
+          <a:bodyPr lIns="0" rIns="0" rtlCol="0" anchor="b" anchorCtr="1"/>
+          <a:lstStyle/>
+          <a:p>
+            <a:pPr algn="r"/>
+            <a:r>
+              <a:rPr lang="en-US" sz="1400" b="1" kern="0" dirty="0">
+                <a:solidFill>
+                  <a:schemeClr val="tx1"/>
+                </a:solidFill>
+              </a:rPr>
+              <a:t>Access</a:t>
+            </a:r>
+          </a:p>
+        </p:txBody>
+      </p:sp>
+      <p:sp>
+        <p:nvSpPr>
+          <p:cNvPr id="114" name="Rounded Rectangle 113"/>
+          <p:cNvSpPr/>
+          <p:nvPr/>
+        </p:nvSpPr>
+        <p:spPr>
+          <a:xfrm flipH="1">
+            <a:off x="5327542" y="1603177"/>
+            <a:ext cx="920858" cy="914380"/>
+          </a:xfrm>
+          <a:prstGeom prst="roundRect">
+            <a:avLst/>
+          </a:prstGeom>
+          <a:solidFill>
+            <a:schemeClr val="accent4">
+              <a:lumMod val="20000"/>
+              <a:lumOff val="80000"/>
+            </a:schemeClr>
+          </a:solidFill>
+          <a:ln>
+            <a:noFill/>
+          </a:ln>
+          <a:effectLst>
+            <a:outerShdw blurRad="50800" dist="38100" dir="2700000" algn="tl" rotWithShape="0">
+              <a:prstClr val="black">
+                <a:alpha val="40000"/>
+              </a:prstClr>
+            </a:outerShdw>
+          </a:effectLst>
+        </p:spPr>
+        <p:style>
+          <a:lnRef idx="2">
+            <a:schemeClr val="accent1">
+              <a:shade val="50000"/>
+            </a:schemeClr>
+          </a:lnRef>
+          <a:fillRef idx="1">
+            <a:schemeClr val="accent1"/>
+          </a:fillRef>
+          <a:effectRef idx="0">
+            <a:schemeClr val="accent1"/>
+          </a:effectRef>
+          <a:fontRef idx="minor">
+            <a:schemeClr val="lt1"/>
+          </a:fontRef>
+        </p:style>
+        <p:txBody>
+          <a:bodyPr lIns="0" rIns="0" rtlCol="0" anchor="b" anchorCtr="1"/>
+          <a:lstStyle/>
+          <a:p>
+            <a:pPr algn="r"/>
+            <a:r>
+              <a:rPr lang="en-US" sz="1400" b="1" kern="0" dirty="0">
+                <a:solidFill>
+                  <a:schemeClr val="tx1"/>
+                </a:solidFill>
+              </a:rPr>
+              <a:t>Analytics</a:t>
+            </a:r>
+          </a:p>
+        </p:txBody>
+      </p:sp>
+      <p:sp>
+        <p:nvSpPr>
+          <p:cNvPr id="133" name="Rounded Rectangle 132"/>
+          <p:cNvSpPr/>
+          <p:nvPr/>
+        </p:nvSpPr>
+        <p:spPr>
+          <a:xfrm>
+            <a:off x="3047999" y="2209801"/>
+            <a:ext cx="1047976" cy="297545"/>
+          </a:xfrm>
+          <a:prstGeom prst="roundRect">
+            <a:avLst/>
+          </a:prstGeom>
+          <a:solidFill>
+            <a:schemeClr val="accent4">
+              <a:lumMod val="20000"/>
+              <a:lumOff val="80000"/>
+            </a:schemeClr>
+          </a:solidFill>
+          <a:ln>
+            <a:noFill/>
+          </a:ln>
+          <a:effectLst>
+            <a:outerShdw blurRad="50800" dist="38100" dir="2700000" algn="tl" rotWithShape="0">
+              <a:prstClr val="black">
+                <a:alpha val="40000"/>
+              </a:prstClr>
+            </a:outerShdw>
+          </a:effectLst>
+        </p:spPr>
+        <p:style>
+          <a:lnRef idx="2">
+            <a:schemeClr val="accent1">
+              <a:shade val="50000"/>
+            </a:schemeClr>
+          </a:lnRef>
+          <a:fillRef idx="1">
+            <a:schemeClr val="accent1"/>
+          </a:fillRef>
+          <a:effectRef idx="0">
+            <a:schemeClr val="accent1"/>
+          </a:effectRef>
+          <a:fontRef idx="minor">
+            <a:schemeClr val="lt1"/>
+          </a:fontRef>
+        </p:style>
+        <p:txBody>
+          <a:bodyPr lIns="0" rIns="0" rtlCol="0" anchor="b" anchorCtr="1"/>
+          <a:lstStyle/>
+          <a:p>
+            <a:pPr algn="r"/>
+            <a:r>
+              <a:rPr lang="en-US" sz="1400" b="1" kern="0" dirty="0">
+                <a:solidFill>
+                  <a:schemeClr val="tx1"/>
+                </a:solidFill>
+              </a:rPr>
+              <a:t>Collection</a:t>
+            </a:r>
+          </a:p>
+        </p:txBody>
+      </p:sp>
+      <p:sp>
+        <p:nvSpPr>
+          <p:cNvPr id="140" name="Rounded Rectangle 139"/>
+          <p:cNvSpPr/>
+          <p:nvPr/>
+        </p:nvSpPr>
+        <p:spPr>
+          <a:xfrm flipH="1">
+            <a:off x="2925680" y="762000"/>
+            <a:ext cx="5608716" cy="371395"/>
+          </a:xfrm>
+          <a:prstGeom prst="roundRect">
+            <a:avLst>
+              <a:gd name="adj" fmla="val 22440"/>
+            </a:avLst>
+          </a:prstGeom>
+          <a:solidFill>
+            <a:schemeClr val="bg1">
+              <a:lumMod val="65000"/>
+            </a:schemeClr>
+          </a:solidFill>
+          <a:ln>
+            <a:noFill/>
+          </a:ln>
+          <a:effectLst>
+            <a:innerShdw blurRad="114300">
+              <a:prstClr val="black"/>
+            </a:innerShdw>
+          </a:effectLst>
+        </p:spPr>
+        <p:style>
+          <a:lnRef idx="2">
+            <a:schemeClr val="accent1">
+              <a:shade val="50000"/>
+            </a:schemeClr>
+          </a:lnRef>
+          <a:fillRef idx="1">
+            <a:schemeClr val="accent1"/>
+          </a:fillRef>
+          <a:effectRef idx="0">
+            <a:schemeClr val="accent1"/>
+          </a:effectRef>
+          <a:fontRef idx="minor">
+            <a:schemeClr val="lt1"/>
+          </a:fontRef>
+        </p:style>
+        <p:txBody>
+          <a:bodyPr rtlCol="0" anchor="ctr"/>
+          <a:lstStyle/>
+          <a:p>
+            <a:pPr algn="ctr"/>
+            <a:endParaRPr lang="en-US" kern="0">
+              <a:solidFill>
+                <a:sysClr val="windowText" lastClr="000000"/>
+              </a:solidFill>
+            </a:endParaRPr>
+          </a:p>
+        </p:txBody>
+      </p:sp>
+      <p:sp>
+        <p:nvSpPr>
+          <p:cNvPr id="141" name="TextBox 140"/>
+          <p:cNvSpPr txBox="1"/>
+          <p:nvPr/>
+        </p:nvSpPr>
+        <p:spPr>
+          <a:xfrm>
+            <a:off x="4436778" y="771093"/>
+            <a:ext cx="2254566" cy="307777"/>
+          </a:xfrm>
+          <a:prstGeom prst="rect">
+            <a:avLst/>
+          </a:prstGeom>
+          <a:noFill/>
+        </p:spPr>
+        <p:txBody>
+          <a:bodyPr wrap="square" rtlCol="0">
+            <a:spAutoFit/>
+          </a:bodyPr>
+          <a:lstStyle/>
+          <a:p>
+            <a:pPr algn="ctr"/>
+            <a:r>
+              <a:rPr lang="en-US" sz="1400" b="1" kern="0" dirty="0" smtClean="0">
+                <a:solidFill>
+                  <a:sysClr val="windowText" lastClr="000000"/>
+                </a:solidFill>
+              </a:rPr>
+              <a:t>System </a:t>
+            </a:r>
+            <a:r>
+              <a:rPr lang="en-US" sz="1400" b="1" kern="0" dirty="0">
+                <a:solidFill>
+                  <a:sysClr val="windowText" lastClr="000000"/>
+                </a:solidFill>
+              </a:rPr>
+              <a:t>Orchestrator</a:t>
+            </a:r>
+          </a:p>
+        </p:txBody>
+      </p:sp>
+      <p:cxnSp>
+        <p:nvCxnSpPr>
+          <p:cNvPr id="142" name="Straight Arrow Connector 141"/>
+          <p:cNvCxnSpPr>
+            <a:stCxn id="140" idx="2"/>
+          </p:cNvCxnSpPr>
+          <p:nvPr/>
+        </p:nvCxnSpPr>
+        <p:spPr>
+          <a:xfrm>
+            <a:off x="5730038" y="1133394"/>
+            <a:ext cx="2" cy="214010"/>
+          </a:xfrm>
+          <a:prstGeom prst="straightConnector1">
+            <a:avLst/>
+          </a:prstGeom>
+          <a:ln w="41275">
+            <a:solidFill>
+              <a:srgbClr val="006600"/>
+            </a:solidFill>
+            <a:tailEnd type="triangle"/>
+          </a:ln>
+        </p:spPr>
+        <p:style>
+          <a:lnRef idx="1">
+            <a:schemeClr val="accent1"/>
+          </a:lnRef>
+          <a:fillRef idx="0">
+            <a:schemeClr val="accent1"/>
+          </a:fillRef>
+          <a:effectRef idx="0">
+            <a:schemeClr val="accent1"/>
+          </a:effectRef>
+          <a:fontRef idx="minor">
+            <a:schemeClr val="tx1"/>
+          </a:fontRef>
+        </p:style>
+      </p:cxnSp>
+      <p:sp>
+        <p:nvSpPr>
+          <p:cNvPr id="152" name="TextBox 151"/>
+          <p:cNvSpPr txBox="1"/>
+          <p:nvPr/>
+        </p:nvSpPr>
+        <p:spPr>
+          <a:xfrm rot="16200000">
+            <a:off x="7807827" y="3603737"/>
+            <a:ext cx="3263124" cy="338554"/>
+          </a:xfrm>
+          <a:prstGeom prst="rect">
+            <a:avLst/>
+          </a:prstGeom>
+          <a:noFill/>
+        </p:spPr>
+        <p:txBody>
+          <a:bodyPr wrap="square" rtlCol="0">
+            <a:spAutoFit/>
+          </a:bodyPr>
+          <a:lstStyle/>
+          <a:p>
+            <a:r>
+              <a:rPr lang="en-US" sz="1600" b="1" kern="0" spc="300" dirty="0"/>
+              <a:t>Security &amp; Privacy</a:t>
+            </a:r>
+          </a:p>
+        </p:txBody>
+      </p:sp>
+      <p:sp>
+        <p:nvSpPr>
+          <p:cNvPr id="153" name="TextBox 152"/>
+          <p:cNvSpPr txBox="1"/>
+          <p:nvPr/>
+        </p:nvSpPr>
+        <p:spPr>
+          <a:xfrm rot="16200000">
+            <a:off x="8477891" y="3948335"/>
+            <a:ext cx="2585175" cy="338554"/>
+          </a:xfrm>
+          <a:prstGeom prst="rect">
+            <a:avLst/>
+          </a:prstGeom>
+          <a:noFill/>
+        </p:spPr>
+        <p:txBody>
+          <a:bodyPr wrap="square" rtlCol="0">
+            <a:spAutoFit/>
+          </a:bodyPr>
+          <a:lstStyle/>
+          <a:p>
+            <a:r>
+              <a:rPr lang="en-US" sz="1600" b="1" kern="0" spc="300" dirty="0"/>
+              <a:t>Management</a:t>
+            </a:r>
+          </a:p>
+        </p:txBody>
+      </p:sp>
+      <p:cxnSp>
+        <p:nvCxnSpPr>
+          <p:cNvPr id="155" name="Straight Arrow Connector 154"/>
+          <p:cNvCxnSpPr/>
+          <p:nvPr/>
+        </p:nvCxnSpPr>
+        <p:spPr>
+          <a:xfrm flipH="1">
+            <a:off x="8534400" y="1973108"/>
+            <a:ext cx="504156" cy="4127"/>
+          </a:xfrm>
+          <a:prstGeom prst="straightConnector1">
+            <a:avLst/>
+          </a:prstGeom>
+          <a:ln w="41275">
+            <a:solidFill>
+              <a:srgbClr val="006600"/>
+            </a:solidFill>
+            <a:tailEnd type="triangle"/>
+          </a:ln>
+        </p:spPr>
+        <p:style>
+          <a:lnRef idx="1">
+            <a:schemeClr val="accent1"/>
+          </a:lnRef>
+          <a:fillRef idx="0">
+            <a:schemeClr val="accent1"/>
+          </a:fillRef>
+          <a:effectRef idx="0">
+            <a:schemeClr val="accent1"/>
+          </a:effectRef>
+          <a:fontRef idx="minor">
+            <a:schemeClr val="tx1"/>
+          </a:fontRef>
+        </p:style>
+      </p:cxnSp>
+      <p:cxnSp>
+        <p:nvCxnSpPr>
+          <p:cNvPr id="157" name="Straight Arrow Connector 156"/>
+          <p:cNvCxnSpPr/>
+          <p:nvPr/>
+        </p:nvCxnSpPr>
+        <p:spPr>
+          <a:xfrm flipH="1">
+            <a:off x="2447040" y="1973868"/>
+            <a:ext cx="478641" cy="1"/>
+          </a:xfrm>
+          <a:prstGeom prst="straightConnector1">
+            <a:avLst/>
+          </a:prstGeom>
+          <a:ln w="41275">
+            <a:solidFill>
+              <a:srgbClr val="006600"/>
+            </a:solidFill>
+            <a:tailEnd type="triangle"/>
+          </a:ln>
+        </p:spPr>
+        <p:style>
+          <a:lnRef idx="1">
+            <a:schemeClr val="accent1"/>
+          </a:lnRef>
+          <a:fillRef idx="0">
+            <a:schemeClr val="accent1"/>
+          </a:fillRef>
+          <a:effectRef idx="0">
+            <a:schemeClr val="accent1"/>
+          </a:effectRef>
+          <a:fontRef idx="minor">
+            <a:schemeClr val="tx1"/>
+          </a:fontRef>
+        </p:style>
+      </p:cxnSp>
+      <p:sp>
+        <p:nvSpPr>
+          <p:cNvPr id="158" name="Up Arrow 157"/>
+          <p:cNvSpPr/>
+          <p:nvPr/>
+        </p:nvSpPr>
+        <p:spPr>
+          <a:xfrm rot="5400000">
+            <a:off x="2562655" y="2069617"/>
+            <a:ext cx="252956" cy="484187"/>
+          </a:xfrm>
+          <a:prstGeom prst="upArrow">
+            <a:avLst/>
+          </a:prstGeom>
+          <a:ln>
+            <a:noFill/>
+          </a:ln>
+        </p:spPr>
+        <p:style>
+          <a:lnRef idx="2">
+            <a:schemeClr val="accent1">
+              <a:shade val="50000"/>
+            </a:schemeClr>
+          </a:lnRef>
+          <a:fillRef idx="1">
+            <a:schemeClr val="accent1"/>
+          </a:fillRef>
+          <a:effectRef idx="0">
+            <a:schemeClr val="accent1"/>
+          </a:effectRef>
+          <a:fontRef idx="minor">
+            <a:schemeClr val="lt1"/>
+          </a:fontRef>
+        </p:style>
+        <p:txBody>
+          <a:bodyPr vert="vert270" rtlCol="0" anchor="ctr"/>
+          <a:lstStyle/>
+          <a:p>
+            <a:pPr algn="ctr"/>
+            <a:r>
+              <a:rPr lang="en-US" sz="900" b="1" kern="0" dirty="0">
+                <a:solidFill>
+                  <a:sysClr val="windowText" lastClr="000000"/>
+                </a:solidFill>
+              </a:rPr>
+              <a:t>DATA</a:t>
+            </a:r>
+          </a:p>
+        </p:txBody>
+      </p:sp>
+      <p:sp>
+        <p:nvSpPr>
+          <p:cNvPr id="160" name="Down Arrow 159"/>
+          <p:cNvSpPr/>
+          <p:nvPr/>
+        </p:nvSpPr>
+        <p:spPr>
+          <a:xfrm rot="5400000">
+            <a:off x="2565299" y="2324288"/>
+            <a:ext cx="228811" cy="456612"/>
+          </a:xfrm>
+          <a:prstGeom prst="downArrow">
+            <a:avLst/>
+          </a:prstGeom>
+          <a:solidFill>
+            <a:srgbClr val="FF0000"/>
+          </a:solidFill>
+          <a:ln>
+            <a:noFill/>
+          </a:ln>
+        </p:spPr>
+        <p:style>
+          <a:lnRef idx="2">
+            <a:schemeClr val="accent1">
+              <a:shade val="50000"/>
+            </a:schemeClr>
+          </a:lnRef>
+          <a:fillRef idx="1">
+            <a:schemeClr val="accent1"/>
+          </a:fillRef>
+          <a:effectRef idx="0">
+            <a:schemeClr val="accent1"/>
+          </a:effectRef>
+          <a:fontRef idx="minor">
+            <a:schemeClr val="lt1"/>
+          </a:fontRef>
+        </p:style>
+        <p:txBody>
+          <a:bodyPr vert="vert270" rtlCol="0" anchor="ctr"/>
+          <a:lstStyle/>
+          <a:p>
+            <a:pPr algn="ctr"/>
+            <a:r>
+              <a:rPr lang="en-US" sz="1100" b="1" kern="0" dirty="0">
+                <a:solidFill>
+                  <a:sysClr val="windowText" lastClr="000000"/>
+                </a:solidFill>
+              </a:rPr>
+              <a:t>SW</a:t>
+            </a:r>
+          </a:p>
+        </p:txBody>
+      </p:sp>
+      <p:sp>
+        <p:nvSpPr>
+          <p:cNvPr id="164" name="Up Arrow 163"/>
+          <p:cNvSpPr/>
+          <p:nvPr/>
+        </p:nvSpPr>
+        <p:spPr>
+          <a:xfrm rot="5400000">
+            <a:off x="8667004" y="2066294"/>
+            <a:ext cx="252956" cy="484187"/>
+          </a:xfrm>
+          <a:prstGeom prst="upArrow">
+            <a:avLst/>
+          </a:prstGeom>
+          <a:ln>
+            <a:noFill/>
+          </a:ln>
+        </p:spPr>
+        <p:style>
+          <a:lnRef idx="2">
+            <a:schemeClr val="accent1">
+              <a:shade val="50000"/>
+            </a:schemeClr>
+          </a:lnRef>
+          <a:fillRef idx="1">
+            <a:schemeClr val="accent1"/>
+          </a:fillRef>
+          <a:effectRef idx="0">
+            <a:schemeClr val="accent1"/>
+          </a:effectRef>
+          <a:fontRef idx="minor">
+            <a:schemeClr val="lt1"/>
+          </a:fontRef>
+        </p:style>
+        <p:txBody>
+          <a:bodyPr vert="vert270" rtlCol="0" anchor="ctr"/>
+          <a:lstStyle/>
+          <a:p>
+            <a:pPr algn="ctr"/>
+            <a:r>
+              <a:rPr lang="en-US" sz="900" b="1" kern="0" dirty="0">
+                <a:solidFill>
+                  <a:sysClr val="windowText" lastClr="000000"/>
+                </a:solidFill>
+              </a:rPr>
+              <a:t>DATA</a:t>
+            </a:r>
+          </a:p>
+        </p:txBody>
+      </p:sp>
+      <p:sp>
+        <p:nvSpPr>
+          <p:cNvPr id="165" name="Down Arrow 164"/>
+          <p:cNvSpPr/>
+          <p:nvPr/>
+        </p:nvSpPr>
+        <p:spPr>
+          <a:xfrm rot="5400000">
+            <a:off x="8669648" y="2320965"/>
+            <a:ext cx="228811" cy="456612"/>
+          </a:xfrm>
+          <a:prstGeom prst="downArrow">
+            <a:avLst/>
+          </a:prstGeom>
+          <a:solidFill>
+            <a:srgbClr val="FF0000"/>
+          </a:solidFill>
+          <a:ln>
+            <a:noFill/>
+          </a:ln>
+        </p:spPr>
+        <p:style>
+          <a:lnRef idx="2">
+            <a:schemeClr val="accent1">
+              <a:shade val="50000"/>
+            </a:schemeClr>
+          </a:lnRef>
+          <a:fillRef idx="1">
+            <a:schemeClr val="accent1"/>
+          </a:fillRef>
+          <a:effectRef idx="0">
+            <a:schemeClr val="accent1"/>
+          </a:effectRef>
+          <a:fontRef idx="minor">
+            <a:schemeClr val="lt1"/>
+          </a:fontRef>
+        </p:style>
+        <p:txBody>
+          <a:bodyPr vert="vert270" rtlCol="0" anchor="ctr"/>
+          <a:lstStyle/>
+          <a:p>
+            <a:pPr algn="ctr"/>
+            <a:r>
+              <a:rPr lang="en-US" sz="1100" b="1" kern="0" dirty="0">
+                <a:solidFill>
+                  <a:sysClr val="windowText" lastClr="000000"/>
+                </a:solidFill>
+              </a:rPr>
+              <a:t>SW</a:t>
+            </a:r>
+          </a:p>
+        </p:txBody>
+      </p:sp>
+      <p:sp>
+        <p:nvSpPr>
+          <p:cNvPr id="173" name="Chevron 172"/>
+          <p:cNvSpPr/>
+          <p:nvPr/>
+        </p:nvSpPr>
+        <p:spPr>
+          <a:xfrm rot="16200000">
+            <a:off x="7802053" y="3128300"/>
+            <a:ext cx="5003652" cy="271049"/>
+          </a:xfrm>
+          <a:prstGeom prst="chevron">
+            <a:avLst/>
+          </a:prstGeom>
+          <a:solidFill>
+            <a:schemeClr val="accent6"/>
+          </a:solidFill>
+          <a:ln>
+            <a:noFill/>
+          </a:ln>
+        </p:spPr>
+        <p:style>
+          <a:lnRef idx="2">
+            <a:schemeClr val="accent1">
+              <a:shade val="50000"/>
+            </a:schemeClr>
+          </a:lnRef>
+          <a:fillRef idx="1">
+            <a:schemeClr val="accent1"/>
+          </a:fillRef>
+          <a:effectRef idx="0">
+            <a:schemeClr val="accent1"/>
+          </a:effectRef>
+          <a:fontRef idx="minor">
+            <a:schemeClr val="lt1"/>
+          </a:fontRef>
+        </p:style>
+        <p:txBody>
+          <a:bodyPr rtlCol="0" anchor="ctr"/>
+          <a:lstStyle/>
+          <a:p>
+            <a:pPr algn="ctr"/>
+            <a:endParaRPr lang="en-US" kern="0" dirty="0">
+              <a:solidFill>
+                <a:schemeClr val="tx1"/>
+              </a:solidFill>
+            </a:endParaRPr>
+          </a:p>
+        </p:txBody>
+      </p:sp>
+      <p:sp>
+        <p:nvSpPr>
+          <p:cNvPr id="174" name="TextBox 173"/>
+          <p:cNvSpPr txBox="1"/>
+          <p:nvPr/>
+        </p:nvSpPr>
+        <p:spPr>
+          <a:xfrm>
+            <a:off x="2743200" y="67462"/>
+            <a:ext cx="6172199" cy="369332"/>
+          </a:xfrm>
+          <a:prstGeom prst="rect">
+            <a:avLst/>
+          </a:prstGeom>
+          <a:noFill/>
+          <a:effectLst/>
+        </p:spPr>
+        <p:txBody>
+          <a:bodyPr wrap="square" rtlCol="0">
+            <a:spAutoFit/>
+          </a:bodyPr>
+          <a:lstStyle/>
+          <a:p>
+            <a:pPr algn="ctr"/>
+            <a:r>
+              <a:rPr lang="en-US" b="1" kern="0" spc="300" dirty="0">
+                <a:effectLst>
+                  <a:outerShdw blurRad="38100" dist="38100" dir="2700000" algn="tl">
+                    <a:srgbClr val="000000">
+                      <a:alpha val="43137"/>
+                    </a:srgbClr>
+                  </a:outerShdw>
+                </a:effectLst>
+              </a:rPr>
+              <a:t>INFORMATION VALUE CHAIN</a:t>
+            </a:r>
+          </a:p>
+        </p:txBody>
+      </p:sp>
+      <p:sp>
+        <p:nvSpPr>
+          <p:cNvPr id="176" name="TextBox 175"/>
+          <p:cNvSpPr txBox="1"/>
+          <p:nvPr/>
+        </p:nvSpPr>
+        <p:spPr>
+          <a:xfrm rot="16200000">
+            <a:off x="8411498" y="3046542"/>
+            <a:ext cx="3767714" cy="369332"/>
+          </a:xfrm>
+          <a:prstGeom prst="rect">
+            <a:avLst/>
+          </a:prstGeom>
+          <a:noFill/>
+        </p:spPr>
+        <p:txBody>
+          <a:bodyPr wrap="square" rtlCol="0">
+            <a:spAutoFit/>
+          </a:bodyPr>
+          <a:lstStyle/>
+          <a:p>
+            <a:pPr algn="ctr"/>
+            <a:r>
+              <a:rPr lang="en-US" b="1" kern="0" spc="300" dirty="0">
+                <a:effectLst>
+                  <a:outerShdw blurRad="38100" dist="38100" dir="2700000" algn="tl">
+                    <a:srgbClr val="000000">
+                      <a:alpha val="43137"/>
+                    </a:srgbClr>
+                  </a:outerShdw>
+                </a:effectLst>
+              </a:rPr>
+              <a:t>IT VALUE CHAIN</a:t>
+            </a:r>
+          </a:p>
+        </p:txBody>
+      </p:sp>
+      <p:sp>
+        <p:nvSpPr>
+          <p:cNvPr id="62" name="Rounded Rectangle 61"/>
+          <p:cNvSpPr/>
+          <p:nvPr/>
+        </p:nvSpPr>
+        <p:spPr>
+          <a:xfrm flipH="1">
+            <a:off x="3047999" y="1564017"/>
+            <a:ext cx="5410200" cy="267835"/>
+          </a:xfrm>
+          <a:prstGeom prst="roundRect">
+            <a:avLst/>
+          </a:prstGeom>
+          <a:solidFill>
+            <a:schemeClr val="accent4">
+              <a:lumMod val="20000"/>
+              <a:lumOff val="80000"/>
+            </a:schemeClr>
+          </a:solidFill>
+          <a:ln>
+            <a:noFill/>
+          </a:ln>
+          <a:effectLst/>
+        </p:spPr>
+        <p:style>
+          <a:lnRef idx="2">
+            <a:schemeClr val="accent1">
+              <a:shade val="50000"/>
+            </a:schemeClr>
+          </a:lnRef>
+          <a:fillRef idx="1">
+            <a:schemeClr val="accent1"/>
+          </a:fillRef>
+          <a:effectRef idx="0">
+            <a:schemeClr val="accent1"/>
+          </a:effectRef>
+          <a:fontRef idx="minor">
+            <a:schemeClr val="lt1"/>
+          </a:fontRef>
+        </p:style>
+        <p:txBody>
+          <a:bodyPr lIns="0" rIns="0" rtlCol="0" anchor="b" anchorCtr="1"/>
+          <a:lstStyle/>
+          <a:p>
+            <a:pPr algn="r"/>
+            <a:endParaRPr lang="en-US" sz="1400" b="1" kern="0" dirty="0">
+              <a:solidFill>
+                <a:schemeClr val="tx1"/>
+              </a:solidFill>
+            </a:endParaRPr>
+          </a:p>
+        </p:txBody>
+      </p:sp>
+      <p:sp>
+        <p:nvSpPr>
+          <p:cNvPr id="64" name="Rounded Rectangle 63"/>
+          <p:cNvSpPr/>
+          <p:nvPr/>
+        </p:nvSpPr>
+        <p:spPr>
+          <a:xfrm flipH="1">
+            <a:off x="6418638" y="1905001"/>
+            <a:ext cx="2039561" cy="238764"/>
+          </a:xfrm>
+          <a:prstGeom prst="roundRect">
+            <a:avLst/>
+          </a:prstGeom>
+          <a:solidFill>
+            <a:schemeClr val="accent4">
+              <a:lumMod val="20000"/>
+              <a:lumOff val="80000"/>
+            </a:schemeClr>
+          </a:solidFill>
+          <a:ln>
+            <a:noFill/>
+          </a:ln>
+          <a:effectLst/>
+        </p:spPr>
+        <p:style>
+          <a:lnRef idx="2">
+            <a:schemeClr val="accent1">
+              <a:shade val="50000"/>
+            </a:schemeClr>
+          </a:lnRef>
+          <a:fillRef idx="1">
+            <a:schemeClr val="accent1"/>
+          </a:fillRef>
+          <a:effectRef idx="0">
+            <a:schemeClr val="accent1"/>
+          </a:effectRef>
+          <a:fontRef idx="minor">
+            <a:schemeClr val="lt1"/>
+          </a:fontRef>
+        </p:style>
+        <p:txBody>
+          <a:bodyPr lIns="0" rIns="0" rtlCol="0" anchor="b" anchorCtr="1"/>
+          <a:lstStyle/>
+          <a:p>
+            <a:pPr algn="r"/>
+            <a:endParaRPr lang="en-US" sz="1400" b="1" kern="0" dirty="0">
+              <a:solidFill>
+                <a:schemeClr val="tx1"/>
+              </a:solidFill>
+            </a:endParaRPr>
+          </a:p>
+        </p:txBody>
+      </p:sp>
+      <p:sp>
+        <p:nvSpPr>
+          <p:cNvPr id="65" name="Rounded Rectangle 64"/>
+          <p:cNvSpPr/>
+          <p:nvPr/>
+        </p:nvSpPr>
+        <p:spPr>
+          <a:xfrm flipH="1">
+            <a:off x="3041545" y="1905000"/>
+            <a:ext cx="2140055" cy="236452"/>
+          </a:xfrm>
+          <a:prstGeom prst="roundRect">
+            <a:avLst/>
+          </a:prstGeom>
+          <a:solidFill>
+            <a:schemeClr val="accent4">
+              <a:lumMod val="20000"/>
+              <a:lumOff val="80000"/>
+            </a:schemeClr>
+          </a:solidFill>
+          <a:ln>
+            <a:noFill/>
+          </a:ln>
+          <a:effectLst/>
+        </p:spPr>
+        <p:style>
+          <a:lnRef idx="2">
+            <a:schemeClr val="accent1">
+              <a:shade val="50000"/>
+            </a:schemeClr>
+          </a:lnRef>
+          <a:fillRef idx="1">
+            <a:schemeClr val="accent1"/>
+          </a:fillRef>
+          <a:effectRef idx="0">
+            <a:schemeClr val="accent1"/>
+          </a:effectRef>
+          <a:fontRef idx="minor">
+            <a:schemeClr val="lt1"/>
+          </a:fontRef>
+        </p:style>
+        <p:txBody>
+          <a:bodyPr lIns="0" rIns="0" rtlCol="0" anchor="b" anchorCtr="1"/>
+          <a:lstStyle/>
+          <a:p>
+            <a:pPr algn="r"/>
+            <a:endParaRPr lang="en-US" sz="1400" b="1" kern="0" dirty="0">
+              <a:solidFill>
+                <a:schemeClr val="tx1"/>
+              </a:solidFill>
+            </a:endParaRPr>
+          </a:p>
+        </p:txBody>
+      </p:sp>
+      <p:sp>
+        <p:nvSpPr>
+          <p:cNvPr id="67" name="Rounded Rectangle 66"/>
+          <p:cNvSpPr/>
+          <p:nvPr/>
+        </p:nvSpPr>
+        <p:spPr>
+          <a:xfrm rot="16200000">
+            <a:off x="8469593" y="1687793"/>
+            <a:ext cx="1776774" cy="334041"/>
+          </a:xfrm>
+          <a:prstGeom prst="roundRect">
+            <a:avLst/>
+          </a:prstGeom>
+          <a:solidFill>
+            <a:schemeClr val="bg1">
+              <a:lumMod val="65000"/>
+            </a:schemeClr>
+          </a:solidFill>
+          <a:ln>
+            <a:noFill/>
+            <a:prstDash val="dash"/>
+          </a:ln>
+          <a:effectLst>
+            <a:innerShdw blurRad="114300">
+              <a:prstClr val="black"/>
+            </a:innerShdw>
+          </a:effectLst>
+        </p:spPr>
+        <p:style>
+          <a:lnRef idx="2">
+            <a:schemeClr val="accent1">
+              <a:shade val="50000"/>
+            </a:schemeClr>
+          </a:lnRef>
+          <a:fillRef idx="1">
+            <a:schemeClr val="accent1"/>
+          </a:fillRef>
+          <a:effectRef idx="0">
+            <a:schemeClr val="accent1"/>
+          </a:effectRef>
+          <a:fontRef idx="minor">
+            <a:schemeClr val="lt1"/>
+          </a:fontRef>
+        </p:style>
+        <p:txBody>
+          <a:bodyPr rtlCol="0" anchor="ctr"/>
+          <a:lstStyle/>
+          <a:p>
+            <a:pPr algn="ctr"/>
+            <a:endParaRPr lang="en-US" sz="1400" b="1" kern="0" dirty="0">
+              <a:solidFill>
+                <a:schemeClr val="tx1"/>
+              </a:solidFill>
+            </a:endParaRPr>
+          </a:p>
+        </p:txBody>
+      </p:sp>
+      <p:sp>
+        <p:nvSpPr>
+          <p:cNvPr id="66" name="Rounded Rectangle 65"/>
+          <p:cNvSpPr/>
+          <p:nvPr/>
+        </p:nvSpPr>
+        <p:spPr>
+          <a:xfrm rot="16200000">
+            <a:off x="8393393" y="1748286"/>
+            <a:ext cx="1776774" cy="334041"/>
+          </a:xfrm>
+          <a:prstGeom prst="roundRect">
+            <a:avLst/>
+          </a:prstGeom>
+          <a:solidFill>
+            <a:schemeClr val="bg1">
+              <a:lumMod val="65000"/>
+            </a:schemeClr>
+          </a:solidFill>
+          <a:ln>
+            <a:noFill/>
+            <a:prstDash val="dash"/>
+          </a:ln>
+          <a:effectLst>
+            <a:innerShdw blurRad="114300">
+              <a:prstClr val="black"/>
+            </a:innerShdw>
+          </a:effectLst>
+        </p:spPr>
+        <p:style>
+          <a:lnRef idx="2">
+            <a:schemeClr val="accent1">
+              <a:shade val="50000"/>
+            </a:schemeClr>
+          </a:lnRef>
+          <a:fillRef idx="1">
+            <a:schemeClr val="accent1"/>
+          </a:fillRef>
+          <a:effectRef idx="0">
+            <a:schemeClr val="accent1"/>
+          </a:effectRef>
+          <a:fontRef idx="minor">
+            <a:schemeClr val="lt1"/>
+          </a:fontRef>
+        </p:style>
+        <p:txBody>
+          <a:bodyPr rtlCol="0" anchor="ctr"/>
+          <a:lstStyle/>
+          <a:p>
+            <a:pPr algn="ctr"/>
+            <a:endParaRPr lang="en-US" sz="1400" b="1" kern="0" dirty="0">
+              <a:solidFill>
+                <a:schemeClr val="tx1"/>
+              </a:solidFill>
+            </a:endParaRPr>
+          </a:p>
+        </p:txBody>
+      </p:sp>
+      <p:sp>
+        <p:nvSpPr>
+          <p:cNvPr id="147" name="Rounded Rectangle 146"/>
+          <p:cNvSpPr/>
+          <p:nvPr/>
+        </p:nvSpPr>
+        <p:spPr>
+          <a:xfrm rot="16200000">
+            <a:off x="8317190" y="1800236"/>
+            <a:ext cx="1776774" cy="334041"/>
+          </a:xfrm>
+          <a:prstGeom prst="roundRect">
+            <a:avLst/>
+          </a:prstGeom>
+          <a:solidFill>
+            <a:schemeClr val="bg1">
+              <a:lumMod val="65000"/>
+            </a:schemeClr>
+          </a:solidFill>
+          <a:ln>
+            <a:noFill/>
+            <a:prstDash val="dash"/>
+          </a:ln>
+          <a:effectLst>
+            <a:innerShdw blurRad="114300">
+              <a:prstClr val="black"/>
+            </a:innerShdw>
+          </a:effectLst>
+        </p:spPr>
+        <p:style>
+          <a:lnRef idx="2">
+            <a:schemeClr val="accent1">
+              <a:shade val="50000"/>
+            </a:schemeClr>
+          </a:lnRef>
+          <a:fillRef idx="1">
+            <a:schemeClr val="accent1"/>
+          </a:fillRef>
+          <a:effectRef idx="0">
+            <a:schemeClr val="accent1"/>
+          </a:effectRef>
+          <a:fontRef idx="minor">
+            <a:schemeClr val="lt1"/>
+          </a:fontRef>
+        </p:style>
+        <p:txBody>
+          <a:bodyPr rtlCol="0" anchor="ctr"/>
+          <a:lstStyle/>
+          <a:p>
+            <a:pPr algn="ctr"/>
+            <a:r>
+              <a:rPr lang="en-US" sz="1400" b="1" kern="0" dirty="0" smtClean="0">
+                <a:solidFill>
+                  <a:schemeClr val="tx1"/>
+                </a:solidFill>
+              </a:rPr>
+              <a:t>Data </a:t>
+            </a:r>
+            <a:r>
+              <a:rPr lang="en-US" sz="1400" b="1" kern="0" dirty="0">
+                <a:solidFill>
+                  <a:schemeClr val="tx1"/>
+                </a:solidFill>
+              </a:rPr>
+              <a:t>Consumer</a:t>
+            </a:r>
+          </a:p>
+        </p:txBody>
+      </p:sp>
+      <p:sp>
+        <p:nvSpPr>
+          <p:cNvPr id="70" name="Rounded Rectangle 69"/>
+          <p:cNvSpPr/>
+          <p:nvPr/>
+        </p:nvSpPr>
+        <p:spPr>
+          <a:xfrm rot="16200000">
+            <a:off x="1378135" y="1692259"/>
+            <a:ext cx="1762207" cy="358323"/>
+          </a:xfrm>
+          <a:prstGeom prst="roundRect">
+            <a:avLst/>
+          </a:prstGeom>
+          <a:solidFill>
+            <a:schemeClr val="bg1">
+              <a:lumMod val="65000"/>
+            </a:schemeClr>
+          </a:solidFill>
+          <a:ln>
+            <a:noFill/>
+            <a:prstDash val="dash"/>
+          </a:ln>
+          <a:effectLst>
+            <a:innerShdw blurRad="114300">
+              <a:prstClr val="black"/>
+            </a:innerShdw>
+          </a:effectLst>
+        </p:spPr>
+        <p:style>
+          <a:lnRef idx="2">
+            <a:schemeClr val="accent1">
+              <a:shade val="50000"/>
+            </a:schemeClr>
+          </a:lnRef>
+          <a:fillRef idx="1">
+            <a:schemeClr val="accent1"/>
+          </a:fillRef>
+          <a:effectRef idx="0">
+            <a:schemeClr val="accent1"/>
+          </a:effectRef>
+          <a:fontRef idx="minor">
+            <a:schemeClr val="lt1"/>
+          </a:fontRef>
+        </p:style>
+        <p:txBody>
+          <a:bodyPr rtlCol="0" anchor="ctr"/>
+          <a:lstStyle/>
+          <a:p>
+            <a:pPr algn="ctr"/>
+            <a:endParaRPr lang="en-US" sz="1400" b="1" kern="0" dirty="0">
+              <a:solidFill>
+                <a:schemeClr val="tx1"/>
+              </a:solidFill>
+            </a:endParaRPr>
+          </a:p>
+        </p:txBody>
+      </p:sp>
+      <p:sp>
+        <p:nvSpPr>
+          <p:cNvPr id="69" name="Rounded Rectangle 68"/>
+          <p:cNvSpPr/>
+          <p:nvPr/>
+        </p:nvSpPr>
+        <p:spPr>
+          <a:xfrm rot="16200000">
+            <a:off x="1301935" y="1759136"/>
+            <a:ext cx="1762207" cy="358323"/>
+          </a:xfrm>
+          <a:prstGeom prst="roundRect">
+            <a:avLst/>
+          </a:prstGeom>
+          <a:solidFill>
+            <a:schemeClr val="bg1">
+              <a:lumMod val="65000"/>
+            </a:schemeClr>
+          </a:solidFill>
+          <a:ln>
+            <a:noFill/>
+            <a:prstDash val="dash"/>
+          </a:ln>
+          <a:effectLst>
+            <a:innerShdw blurRad="114300">
+              <a:prstClr val="black"/>
+            </a:innerShdw>
+          </a:effectLst>
+        </p:spPr>
+        <p:style>
+          <a:lnRef idx="2">
+            <a:schemeClr val="accent1">
+              <a:shade val="50000"/>
+            </a:schemeClr>
+          </a:lnRef>
+          <a:fillRef idx="1">
+            <a:schemeClr val="accent1"/>
+          </a:fillRef>
+          <a:effectRef idx="0">
+            <a:schemeClr val="accent1"/>
+          </a:effectRef>
+          <a:fontRef idx="minor">
+            <a:schemeClr val="lt1"/>
+          </a:fontRef>
+        </p:style>
+        <p:txBody>
+          <a:bodyPr rtlCol="0" anchor="ctr"/>
+          <a:lstStyle/>
+          <a:p>
+            <a:pPr algn="ctr"/>
+            <a:endParaRPr lang="en-US" sz="1400" b="1" kern="0" dirty="0">
+              <a:solidFill>
+                <a:schemeClr val="tx1"/>
+              </a:solidFill>
+            </a:endParaRPr>
+          </a:p>
+        </p:txBody>
+      </p:sp>
+      <p:sp>
+        <p:nvSpPr>
+          <p:cNvPr id="145" name="Rounded Rectangle 144"/>
+          <p:cNvSpPr/>
+          <p:nvPr/>
+        </p:nvSpPr>
+        <p:spPr>
+          <a:xfrm rot="16200000">
+            <a:off x="1225735" y="1835336"/>
+            <a:ext cx="1762207" cy="358323"/>
+          </a:xfrm>
+          <a:prstGeom prst="roundRect">
+            <a:avLst/>
+          </a:prstGeom>
+          <a:solidFill>
+            <a:schemeClr val="bg1">
+              <a:lumMod val="65000"/>
+            </a:schemeClr>
+          </a:solidFill>
+          <a:ln>
+            <a:noFill/>
+            <a:prstDash val="dash"/>
+          </a:ln>
+          <a:effectLst>
+            <a:innerShdw blurRad="114300">
+              <a:prstClr val="black"/>
+            </a:innerShdw>
+          </a:effectLst>
+        </p:spPr>
+        <p:style>
+          <a:lnRef idx="2">
+            <a:schemeClr val="accent1">
+              <a:shade val="50000"/>
+            </a:schemeClr>
+          </a:lnRef>
+          <a:fillRef idx="1">
+            <a:schemeClr val="accent1"/>
+          </a:fillRef>
+          <a:effectRef idx="0">
+            <a:schemeClr val="accent1"/>
+          </a:effectRef>
+          <a:fontRef idx="minor">
+            <a:schemeClr val="lt1"/>
+          </a:fontRef>
+        </p:style>
+        <p:txBody>
+          <a:bodyPr rtlCol="0" anchor="ctr"/>
+          <a:lstStyle/>
+          <a:p>
+            <a:pPr algn="ctr"/>
+            <a:r>
+              <a:rPr lang="en-US" sz="1400" b="1" kern="0" dirty="0" smtClean="0">
+                <a:solidFill>
+                  <a:schemeClr val="tx1"/>
+                </a:solidFill>
+              </a:rPr>
+              <a:t>Data Provider</a:t>
+            </a:r>
+            <a:endParaRPr lang="en-US" sz="1400" b="1" kern="0" dirty="0">
+              <a:solidFill>
+                <a:schemeClr val="tx1"/>
+              </a:solidFill>
+            </a:endParaRPr>
+          </a:p>
+        </p:txBody>
+      </p:sp>
+      <p:sp>
+        <p:nvSpPr>
+          <p:cNvPr id="84" name="Rounded Rectangle 83"/>
+          <p:cNvSpPr/>
+          <p:nvPr/>
+        </p:nvSpPr>
+        <p:spPr>
+          <a:xfrm>
+            <a:off x="3078493" y="2839093"/>
+            <a:ext cx="5836907" cy="3028309"/>
+          </a:xfrm>
+          <a:prstGeom prst="roundRect">
+            <a:avLst>
+              <a:gd name="adj" fmla="val 4083"/>
+            </a:avLst>
+          </a:prstGeom>
+          <a:solidFill>
+            <a:srgbClr val="A6A6A6"/>
+          </a:solidFill>
+          <a:ln>
+            <a:noFill/>
+          </a:ln>
+          <a:effectLst>
+            <a:innerShdw blurRad="114300">
+              <a:prstClr val="black"/>
+            </a:innerShdw>
+          </a:effectLst>
+        </p:spPr>
+        <p:style>
+          <a:lnRef idx="2">
+            <a:schemeClr val="accent1">
+              <a:shade val="50000"/>
+            </a:schemeClr>
+          </a:lnRef>
+          <a:fillRef idx="1">
+            <a:schemeClr val="accent1"/>
+          </a:fillRef>
+          <a:effectRef idx="0">
+            <a:schemeClr val="accent1"/>
+          </a:effectRef>
+          <a:fontRef idx="minor">
+            <a:schemeClr val="lt1"/>
+          </a:fontRef>
+        </p:style>
+        <p:txBody>
+          <a:bodyPr rtlCol="0" anchor="ctr"/>
+          <a:lstStyle/>
+          <a:p>
+            <a:pPr algn="ctr"/>
+            <a:endParaRPr lang="en-US" sz="1600" kern="0">
+              <a:solidFill>
+                <a:sysClr val="windowText" lastClr="000000"/>
+              </a:solidFill>
+            </a:endParaRPr>
+          </a:p>
+        </p:txBody>
+      </p:sp>
+      <p:sp>
+        <p:nvSpPr>
+          <p:cNvPr id="88" name="Rounded Rectangle 87"/>
+          <p:cNvSpPr/>
+          <p:nvPr/>
+        </p:nvSpPr>
+        <p:spPr>
+          <a:xfrm>
+            <a:off x="2984994" y="2945665"/>
+            <a:ext cx="5836907" cy="2921737"/>
+          </a:xfrm>
+          <a:prstGeom prst="roundRect">
+            <a:avLst>
+              <a:gd name="adj" fmla="val 4083"/>
+            </a:avLst>
+          </a:prstGeom>
+          <a:solidFill>
+            <a:srgbClr val="A6A6A6"/>
+          </a:solidFill>
+          <a:ln>
+            <a:noFill/>
+          </a:ln>
+          <a:effectLst>
+            <a:innerShdw blurRad="114300">
+              <a:prstClr val="black"/>
+            </a:innerShdw>
+          </a:effectLst>
+        </p:spPr>
+        <p:style>
+          <a:lnRef idx="2">
+            <a:schemeClr val="accent1">
+              <a:shade val="50000"/>
+            </a:schemeClr>
+          </a:lnRef>
+          <a:fillRef idx="1">
+            <a:schemeClr val="accent1"/>
+          </a:fillRef>
+          <a:effectRef idx="0">
+            <a:schemeClr val="accent1"/>
+          </a:effectRef>
+          <a:fontRef idx="minor">
+            <a:schemeClr val="lt1"/>
+          </a:fontRef>
+        </p:style>
+        <p:txBody>
+          <a:bodyPr rtlCol="0" anchor="ctr"/>
+          <a:lstStyle/>
+          <a:p>
+            <a:pPr algn="ctr"/>
+            <a:endParaRPr lang="en-US" sz="1600" kern="0">
+              <a:solidFill>
+                <a:sysClr val="windowText" lastClr="000000"/>
+              </a:solidFill>
+            </a:endParaRPr>
+          </a:p>
+        </p:txBody>
+      </p:sp>
+      <p:sp>
+        <p:nvSpPr>
+          <p:cNvPr id="85" name="Left-Right Arrow 84"/>
+          <p:cNvSpPr/>
+          <p:nvPr/>
+        </p:nvSpPr>
+        <p:spPr>
+          <a:xfrm>
+            <a:off x="2573176" y="6350818"/>
+            <a:ext cx="975690" cy="353691"/>
+          </a:xfrm>
+          <a:prstGeom prst="leftRightArrow">
+            <a:avLst/>
+          </a:prstGeom>
+          <a:solidFill>
+            <a:schemeClr val="accent1"/>
+          </a:solidFill>
+          <a:ln>
+            <a:noFill/>
+          </a:ln>
+          <a:effectLst>
+            <a:outerShdw blurRad="50800" dist="38100" dir="2700000" algn="tl" rotWithShape="0">
+              <a:prstClr val="black">
+                <a:alpha val="40000"/>
+              </a:prstClr>
+            </a:outerShdw>
+          </a:effectLst>
+        </p:spPr>
+        <p:style>
+          <a:lnRef idx="2">
+            <a:schemeClr val="accent1">
+              <a:shade val="50000"/>
+            </a:schemeClr>
+          </a:lnRef>
+          <a:fillRef idx="1">
+            <a:schemeClr val="accent1"/>
+          </a:fillRef>
+          <a:effectRef idx="0">
+            <a:schemeClr val="accent1"/>
+          </a:effectRef>
+          <a:fontRef idx="minor">
+            <a:schemeClr val="lt1"/>
+          </a:fontRef>
+        </p:style>
+        <p:txBody>
+          <a:bodyPr rtlCol="0" anchor="ctr"/>
+          <a:lstStyle/>
+          <a:p>
+            <a:pPr algn="ctr"/>
+            <a:r>
+              <a:rPr lang="en-US" sz="1400" b="1" kern="0" spc="50" dirty="0">
+                <a:solidFill>
+                  <a:sysClr val="windowText" lastClr="000000"/>
+                </a:solidFill>
+              </a:rPr>
+              <a:t>DATA</a:t>
+            </a:r>
+          </a:p>
+        </p:txBody>
+      </p:sp>
+      <p:sp>
+        <p:nvSpPr>
+          <p:cNvPr id="94" name="Rounded Rectangle 93"/>
+          <p:cNvSpPr/>
+          <p:nvPr/>
+        </p:nvSpPr>
+        <p:spPr>
+          <a:xfrm>
+            <a:off x="2895600" y="3058055"/>
+            <a:ext cx="5608718" cy="2809346"/>
+          </a:xfrm>
+          <a:prstGeom prst="roundRect">
+            <a:avLst>
+              <a:gd name="adj" fmla="val 4083"/>
+            </a:avLst>
+          </a:prstGeom>
+          <a:solidFill>
+            <a:srgbClr val="A6A6A6"/>
+          </a:solidFill>
+          <a:ln>
+            <a:noFill/>
+          </a:ln>
+          <a:effectLst>
+            <a:innerShdw blurRad="114300">
+              <a:prstClr val="black"/>
+            </a:innerShdw>
+          </a:effectLst>
+        </p:spPr>
+        <p:style>
+          <a:lnRef idx="2">
+            <a:schemeClr val="accent1">
+              <a:shade val="50000"/>
+            </a:schemeClr>
+          </a:lnRef>
+          <a:fillRef idx="1">
+            <a:schemeClr val="accent1"/>
+          </a:fillRef>
+          <a:effectRef idx="0">
+            <a:schemeClr val="accent1"/>
+          </a:effectRef>
+          <a:fontRef idx="minor">
+            <a:schemeClr val="lt1"/>
+          </a:fontRef>
+        </p:style>
+        <p:txBody>
+          <a:bodyPr rtlCol="0" anchor="ctr"/>
+          <a:lstStyle/>
+          <a:p>
+            <a:pPr algn="ctr"/>
+            <a:endParaRPr lang="en-US" sz="1600" kern="0">
+              <a:solidFill>
+                <a:sysClr val="windowText" lastClr="000000"/>
+              </a:solidFill>
+            </a:endParaRPr>
+          </a:p>
+        </p:txBody>
+      </p:sp>
+      <p:sp>
+        <p:nvSpPr>
+          <p:cNvPr id="78" name="Rounded Rectangle 77"/>
+          <p:cNvSpPr/>
+          <p:nvPr/>
+        </p:nvSpPr>
+        <p:spPr>
+          <a:xfrm>
+            <a:off x="2951514" y="3076327"/>
+            <a:ext cx="5751834" cy="2689324"/>
+          </a:xfrm>
+          <a:prstGeom prst="roundRect">
+            <a:avLst>
+              <a:gd name="adj" fmla="val 4799"/>
+            </a:avLst>
+          </a:prstGeom>
+          <a:solidFill>
+            <a:schemeClr val="bg1">
+              <a:lumMod val="95000"/>
+            </a:schemeClr>
+          </a:solidFill>
+          <a:ln>
+            <a:noFill/>
+          </a:ln>
+          <a:effectLst/>
+        </p:spPr>
+        <p:style>
+          <a:lnRef idx="2">
+            <a:schemeClr val="accent1">
+              <a:shade val="50000"/>
+            </a:schemeClr>
+          </a:lnRef>
+          <a:fillRef idx="1">
+            <a:schemeClr val="accent1"/>
+          </a:fillRef>
+          <a:effectRef idx="0">
+            <a:schemeClr val="accent1"/>
+          </a:effectRef>
+          <a:fontRef idx="minor">
+            <a:schemeClr val="lt1"/>
+          </a:fontRef>
+        </p:style>
+        <p:txBody>
+          <a:bodyPr rtlCol="0" anchor="ctr"/>
+          <a:lstStyle/>
+          <a:p>
+            <a:pPr algn="ctr"/>
+            <a:endParaRPr lang="en-US" kern="0">
+              <a:solidFill>
+                <a:sysClr val="windowText" lastClr="000000"/>
+              </a:solidFill>
+            </a:endParaRPr>
+          </a:p>
+        </p:txBody>
+      </p:sp>
+      <p:sp>
+        <p:nvSpPr>
+          <p:cNvPr id="77" name="Rounded Rectangle 76"/>
+          <p:cNvSpPr/>
+          <p:nvPr/>
+        </p:nvSpPr>
+        <p:spPr>
+          <a:xfrm flipH="1">
+            <a:off x="3432788" y="4870943"/>
+            <a:ext cx="4632477" cy="698856"/>
+          </a:xfrm>
+          <a:prstGeom prst="roundRect">
+            <a:avLst>
+              <a:gd name="adj" fmla="val 22440"/>
+            </a:avLst>
+          </a:prstGeom>
+          <a:solidFill>
+            <a:schemeClr val="bg1">
+              <a:lumMod val="65000"/>
+            </a:schemeClr>
+          </a:solidFill>
+          <a:ln>
+            <a:noFill/>
+          </a:ln>
+          <a:effectLst>
+            <a:innerShdw blurRad="114300">
+              <a:prstClr val="black"/>
+            </a:innerShdw>
+          </a:effectLst>
+        </p:spPr>
+        <p:style>
+          <a:lnRef idx="2">
+            <a:schemeClr val="accent1">
+              <a:shade val="50000"/>
+            </a:schemeClr>
+          </a:lnRef>
+          <a:fillRef idx="1">
+            <a:schemeClr val="accent1"/>
+          </a:fillRef>
+          <a:effectRef idx="0">
+            <a:schemeClr val="accent1"/>
+          </a:effectRef>
+          <a:fontRef idx="minor">
+            <a:schemeClr val="lt1"/>
+          </a:fontRef>
+        </p:style>
+        <p:txBody>
+          <a:bodyPr rtlCol="0" anchor="ctr"/>
+          <a:lstStyle/>
+          <a:p>
+            <a:pPr algn="ctr"/>
+            <a:endParaRPr lang="en-US" kern="0">
+              <a:solidFill>
+                <a:sysClr val="windowText" lastClr="000000"/>
+              </a:solidFill>
+            </a:endParaRPr>
+          </a:p>
+        </p:txBody>
+      </p:sp>
+      <p:sp>
+        <p:nvSpPr>
+          <p:cNvPr id="73" name="Rounded Rectangle 72"/>
+          <p:cNvSpPr/>
+          <p:nvPr/>
+        </p:nvSpPr>
+        <p:spPr>
+          <a:xfrm flipH="1">
+            <a:off x="3441937" y="3380440"/>
+            <a:ext cx="4641000" cy="737173"/>
+          </a:xfrm>
+          <a:prstGeom prst="roundRect">
+            <a:avLst>
+              <a:gd name="adj" fmla="val 22440"/>
+            </a:avLst>
+          </a:prstGeom>
+          <a:solidFill>
+            <a:schemeClr val="bg1">
+              <a:lumMod val="65000"/>
+            </a:schemeClr>
+          </a:solidFill>
+          <a:ln>
+            <a:noFill/>
+          </a:ln>
+          <a:effectLst>
+            <a:innerShdw blurRad="114300">
+              <a:prstClr val="black"/>
+            </a:innerShdw>
+          </a:effectLst>
+        </p:spPr>
+        <p:style>
+          <a:lnRef idx="2">
+            <a:schemeClr val="accent1">
+              <a:shade val="50000"/>
+            </a:schemeClr>
+          </a:lnRef>
+          <a:fillRef idx="1">
+            <a:schemeClr val="accent1"/>
+          </a:fillRef>
+          <a:effectRef idx="0">
+            <a:schemeClr val="accent1"/>
+          </a:effectRef>
+          <a:fontRef idx="minor">
+            <a:schemeClr val="lt1"/>
+          </a:fontRef>
+        </p:style>
+        <p:txBody>
+          <a:bodyPr rtlCol="0" anchor="ctr"/>
+          <a:lstStyle/>
+          <a:p>
+            <a:pPr algn="ctr"/>
+            <a:endParaRPr lang="en-US" kern="0">
+              <a:solidFill>
+                <a:sysClr val="windowText" lastClr="000000"/>
+              </a:solidFill>
+            </a:endParaRPr>
+          </a:p>
+        </p:txBody>
+      </p:sp>
+      <p:sp>
+        <p:nvSpPr>
+          <p:cNvPr id="74" name="Rounded Rectangle 73"/>
+          <p:cNvSpPr/>
+          <p:nvPr/>
+        </p:nvSpPr>
+        <p:spPr>
+          <a:xfrm flipH="1">
+            <a:off x="3441937" y="4164488"/>
+            <a:ext cx="4623328" cy="665259"/>
+          </a:xfrm>
+          <a:prstGeom prst="roundRect">
+            <a:avLst>
+              <a:gd name="adj" fmla="val 22440"/>
+            </a:avLst>
+          </a:prstGeom>
+          <a:solidFill>
+            <a:schemeClr val="bg1">
+              <a:lumMod val="65000"/>
+            </a:schemeClr>
+          </a:solidFill>
+          <a:ln>
+            <a:noFill/>
+          </a:ln>
+          <a:effectLst>
+            <a:innerShdw blurRad="114300">
+              <a:prstClr val="black"/>
+            </a:innerShdw>
+          </a:effectLst>
+        </p:spPr>
+        <p:style>
+          <a:lnRef idx="2">
+            <a:schemeClr val="accent1">
+              <a:shade val="50000"/>
+            </a:schemeClr>
+          </a:lnRef>
+          <a:fillRef idx="1">
+            <a:schemeClr val="accent1"/>
+          </a:fillRef>
+          <a:effectRef idx="0">
+            <a:schemeClr val="accent1"/>
+          </a:effectRef>
+          <a:fontRef idx="minor">
+            <a:schemeClr val="lt1"/>
+          </a:fontRef>
+        </p:style>
+        <p:txBody>
+          <a:bodyPr rtlCol="0" anchor="ctr"/>
+          <a:lstStyle/>
+          <a:p>
+            <a:pPr algn="ctr"/>
+            <a:endParaRPr lang="en-US" kern="0">
+              <a:solidFill>
+                <a:sysClr val="windowText" lastClr="000000"/>
+              </a:solidFill>
+            </a:endParaRPr>
+          </a:p>
+        </p:txBody>
+      </p:sp>
+      <p:sp>
+        <p:nvSpPr>
+          <p:cNvPr id="100" name="Rounded Rectangle 99"/>
+          <p:cNvSpPr/>
+          <p:nvPr/>
+        </p:nvSpPr>
+        <p:spPr>
+          <a:xfrm flipH="1">
+            <a:off x="3532045" y="5105400"/>
+            <a:ext cx="2543513" cy="177332"/>
+          </a:xfrm>
+          <a:prstGeom prst="roundRect">
+            <a:avLst/>
+          </a:prstGeom>
+          <a:solidFill>
+            <a:srgbClr val="DDD9C3"/>
+          </a:solidFill>
+          <a:ln>
+            <a:noFill/>
+          </a:ln>
+        </p:spPr>
+        <p:style>
+          <a:lnRef idx="2">
+            <a:schemeClr val="accent1">
+              <a:shade val="50000"/>
+            </a:schemeClr>
+          </a:lnRef>
+          <a:fillRef idx="1">
+            <a:schemeClr val="accent1"/>
+          </a:fillRef>
+          <a:effectRef idx="0">
+            <a:schemeClr val="accent1"/>
+          </a:effectRef>
+          <a:fontRef idx="minor">
+            <a:schemeClr val="lt1"/>
+          </a:fontRef>
+        </p:style>
+        <p:txBody>
+          <a:bodyPr rtlCol="0" anchor="ctr"/>
+          <a:lstStyle/>
+          <a:p>
+            <a:r>
+              <a:rPr lang="en-US" sz="1200" b="1" kern="0" dirty="0">
+                <a:solidFill>
+                  <a:schemeClr val="tx1"/>
+                </a:solidFill>
+              </a:rPr>
+              <a:t>Virtual Resources</a:t>
+            </a:r>
+          </a:p>
+        </p:txBody>
+      </p:sp>
+      <p:sp>
+        <p:nvSpPr>
+          <p:cNvPr id="103" name="Rounded Rectangle 102"/>
+          <p:cNvSpPr/>
+          <p:nvPr/>
+        </p:nvSpPr>
+        <p:spPr>
+          <a:xfrm rot="16200000" flipH="1">
+            <a:off x="6847899" y="4351348"/>
+            <a:ext cx="432191" cy="1874013"/>
+          </a:xfrm>
+          <a:prstGeom prst="roundRect">
+            <a:avLst/>
+          </a:prstGeom>
+          <a:solidFill>
+            <a:srgbClr val="DDD9C3"/>
+          </a:solidFill>
+          <a:ln>
+            <a:noFill/>
+          </a:ln>
+        </p:spPr>
+        <p:style>
+          <a:lnRef idx="2">
+            <a:schemeClr val="accent1">
+              <a:shade val="50000"/>
+            </a:schemeClr>
+          </a:lnRef>
+          <a:fillRef idx="1">
+            <a:schemeClr val="accent1"/>
+          </a:fillRef>
+          <a:effectRef idx="0">
+            <a:schemeClr val="accent1"/>
+          </a:effectRef>
+          <a:fontRef idx="minor">
+            <a:schemeClr val="lt1"/>
+          </a:fontRef>
+        </p:style>
+        <p:txBody>
+          <a:bodyPr rtlCol="0" anchor="ctr"/>
+          <a:lstStyle/>
+          <a:p>
+            <a:pPr algn="ctr"/>
+            <a:endParaRPr lang="en-US" sz="3200" kern="0">
+              <a:solidFill>
+                <a:sysClr val="windowText" lastClr="000000"/>
+              </a:solidFill>
+            </a:endParaRPr>
+          </a:p>
+        </p:txBody>
+      </p:sp>
+      <p:sp>
+        <p:nvSpPr>
+          <p:cNvPr id="102" name="Rounded Rectangle 101"/>
+          <p:cNvSpPr/>
+          <p:nvPr/>
+        </p:nvSpPr>
+        <p:spPr>
+          <a:xfrm flipH="1">
+            <a:off x="3532046" y="5312205"/>
+            <a:ext cx="4419601" cy="192245"/>
+          </a:xfrm>
+          <a:prstGeom prst="roundRect">
+            <a:avLst/>
+          </a:prstGeom>
+          <a:solidFill>
+            <a:srgbClr val="DDD9C3"/>
+          </a:solidFill>
+          <a:ln>
+            <a:noFill/>
+          </a:ln>
+        </p:spPr>
+        <p:style>
+          <a:lnRef idx="2">
+            <a:schemeClr val="accent1">
+              <a:shade val="50000"/>
+            </a:schemeClr>
+          </a:lnRef>
+          <a:fillRef idx="1">
+            <a:schemeClr val="accent1"/>
+          </a:fillRef>
+          <a:effectRef idx="0">
+            <a:schemeClr val="accent1"/>
+          </a:effectRef>
+          <a:fontRef idx="minor">
+            <a:schemeClr val="lt1"/>
+          </a:fontRef>
+        </p:style>
+        <p:txBody>
+          <a:bodyPr rtlCol="0" anchor="ctr"/>
+          <a:lstStyle/>
+          <a:p>
+            <a:pPr algn="ctr"/>
+            <a:r>
+              <a:rPr lang="en-US" sz="1200" b="1" kern="0" dirty="0">
+                <a:solidFill>
+                  <a:schemeClr val="tx1"/>
+                </a:solidFill>
+              </a:rPr>
+              <a:t>Physical Resources</a:t>
+            </a:r>
+          </a:p>
+        </p:txBody>
+      </p:sp>
+      <p:sp>
+        <p:nvSpPr>
+          <p:cNvPr id="124" name="Rounded Rectangle 123"/>
+          <p:cNvSpPr/>
+          <p:nvPr/>
+        </p:nvSpPr>
+        <p:spPr>
+          <a:xfrm rot="16200000" flipH="1">
+            <a:off x="3498282" y="4379035"/>
+            <a:ext cx="434092" cy="395437"/>
+          </a:xfrm>
+          <a:prstGeom prst="roundRect">
+            <a:avLst/>
+          </a:prstGeom>
+          <a:solidFill>
+            <a:srgbClr val="C6D9F1"/>
+          </a:solidFill>
+          <a:ln>
+            <a:noFill/>
+          </a:ln>
+        </p:spPr>
+        <p:style>
+          <a:lnRef idx="2">
+            <a:schemeClr val="accent1">
+              <a:shade val="50000"/>
+            </a:schemeClr>
+          </a:lnRef>
+          <a:fillRef idx="1">
+            <a:schemeClr val="accent1"/>
+          </a:fillRef>
+          <a:effectRef idx="0">
+            <a:schemeClr val="accent1"/>
+          </a:effectRef>
+          <a:fontRef idx="minor">
+            <a:schemeClr val="lt1"/>
+          </a:fontRef>
+        </p:style>
+        <p:txBody>
+          <a:bodyPr rtlCol="0" anchor="ctr"/>
+          <a:lstStyle/>
+          <a:p>
+            <a:pPr algn="ctr"/>
+            <a:endParaRPr lang="en-US" sz="3200" kern="0">
+              <a:solidFill>
+                <a:sysClr val="windowText" lastClr="000000"/>
+              </a:solidFill>
+            </a:endParaRPr>
+          </a:p>
+        </p:txBody>
+      </p:sp>
+      <p:sp>
+        <p:nvSpPr>
+          <p:cNvPr id="125" name="Rounded Rectangle 124"/>
+          <p:cNvSpPr/>
+          <p:nvPr/>
+        </p:nvSpPr>
+        <p:spPr>
+          <a:xfrm flipH="1">
+            <a:off x="3532047" y="4346377"/>
+            <a:ext cx="4018214" cy="216096"/>
+          </a:xfrm>
+          <a:prstGeom prst="roundRect">
+            <a:avLst/>
+          </a:prstGeom>
+          <a:solidFill>
+            <a:srgbClr val="C6D9F1"/>
+          </a:solidFill>
+          <a:ln>
+            <a:noFill/>
+          </a:ln>
+        </p:spPr>
+        <p:style>
+          <a:lnRef idx="2">
+            <a:schemeClr val="accent1">
+              <a:shade val="50000"/>
+            </a:schemeClr>
+          </a:lnRef>
+          <a:fillRef idx="1">
+            <a:schemeClr val="accent1"/>
+          </a:fillRef>
+          <a:effectRef idx="0">
+            <a:schemeClr val="accent1"/>
+          </a:effectRef>
+          <a:fontRef idx="minor">
+            <a:schemeClr val="lt1"/>
+          </a:fontRef>
+        </p:style>
+        <p:txBody>
+          <a:bodyPr rtlCol="0" anchor="ctr"/>
+          <a:lstStyle/>
+          <a:p>
+            <a:r>
+              <a:rPr lang="en-US" sz="1200" b="1" kern="0" dirty="0">
+                <a:solidFill>
+                  <a:schemeClr val="tx1"/>
+                </a:solidFill>
+              </a:rPr>
+              <a:t>Indexed Storage</a:t>
+            </a:r>
+            <a:endParaRPr lang="en-US" sz="2000" b="1" kern="0" dirty="0">
+              <a:solidFill>
+                <a:schemeClr val="tx1"/>
+              </a:solidFill>
+            </a:endParaRPr>
+          </a:p>
+        </p:txBody>
+      </p:sp>
+      <p:sp>
+        <p:nvSpPr>
+          <p:cNvPr id="122" name="Rounded Rectangle 121"/>
+          <p:cNvSpPr/>
+          <p:nvPr/>
+        </p:nvSpPr>
+        <p:spPr>
+          <a:xfrm rot="16200000" flipH="1">
+            <a:off x="7587186" y="4364756"/>
+            <a:ext cx="432190" cy="395437"/>
+          </a:xfrm>
+          <a:prstGeom prst="roundRect">
+            <a:avLst/>
+          </a:prstGeom>
+          <a:solidFill>
+            <a:srgbClr val="C6D9F1"/>
+          </a:solidFill>
+          <a:ln>
+            <a:noFill/>
+          </a:ln>
+        </p:spPr>
+        <p:style>
+          <a:lnRef idx="2">
+            <a:schemeClr val="accent1">
+              <a:shade val="50000"/>
+            </a:schemeClr>
+          </a:lnRef>
+          <a:fillRef idx="1">
+            <a:schemeClr val="accent1"/>
+          </a:fillRef>
+          <a:effectRef idx="0">
+            <a:schemeClr val="accent1"/>
+          </a:effectRef>
+          <a:fontRef idx="minor">
+            <a:schemeClr val="lt1"/>
+          </a:fontRef>
+        </p:style>
+        <p:txBody>
+          <a:bodyPr rtlCol="0" anchor="ctr"/>
+          <a:lstStyle/>
+          <a:p>
+            <a:pPr algn="ctr"/>
+            <a:endParaRPr lang="en-US" sz="3200" kern="0">
+              <a:solidFill>
+                <a:sysClr val="windowText" lastClr="000000"/>
+              </a:solidFill>
+            </a:endParaRPr>
+          </a:p>
+        </p:txBody>
+      </p:sp>
+      <p:sp>
+        <p:nvSpPr>
+          <p:cNvPr id="123" name="Rounded Rectangle 122"/>
+          <p:cNvSpPr/>
+          <p:nvPr/>
+        </p:nvSpPr>
+        <p:spPr>
+          <a:xfrm flipH="1">
+            <a:off x="3989247" y="4588177"/>
+            <a:ext cx="3962399" cy="190391"/>
+          </a:xfrm>
+          <a:prstGeom prst="roundRect">
+            <a:avLst/>
+          </a:prstGeom>
+          <a:solidFill>
+            <a:srgbClr val="C6D9F1"/>
+          </a:solidFill>
+          <a:ln>
+            <a:noFill/>
+          </a:ln>
+        </p:spPr>
+        <p:style>
+          <a:lnRef idx="2">
+            <a:schemeClr val="accent1">
+              <a:shade val="50000"/>
+            </a:schemeClr>
+          </a:lnRef>
+          <a:fillRef idx="1">
+            <a:schemeClr val="accent1"/>
+          </a:fillRef>
+          <a:effectRef idx="0">
+            <a:schemeClr val="accent1"/>
+          </a:effectRef>
+          <a:fontRef idx="minor">
+            <a:schemeClr val="lt1"/>
+          </a:fontRef>
+        </p:style>
+        <p:txBody>
+          <a:bodyPr rtlCol="0" anchor="ctr"/>
+          <a:lstStyle/>
+          <a:p>
+            <a:pPr algn="r"/>
+            <a:r>
+              <a:rPr lang="en-US" sz="1200" b="1" kern="0" dirty="0">
+                <a:solidFill>
+                  <a:schemeClr val="tx1"/>
+                </a:solidFill>
+              </a:rPr>
+              <a:t>File Systems</a:t>
+            </a:r>
+          </a:p>
+        </p:txBody>
+      </p:sp>
+      <p:sp>
+        <p:nvSpPr>
+          <p:cNvPr id="96" name="TextBox 95"/>
+          <p:cNvSpPr txBox="1"/>
+          <p:nvPr/>
+        </p:nvSpPr>
+        <p:spPr>
+          <a:xfrm>
+            <a:off x="2966700" y="3045024"/>
+            <a:ext cx="2748301" cy="307777"/>
+          </a:xfrm>
+          <a:prstGeom prst="rect">
+            <a:avLst/>
+          </a:prstGeom>
+          <a:noFill/>
+        </p:spPr>
+        <p:txBody>
+          <a:bodyPr wrap="square" rtlCol="0">
+            <a:spAutoFit/>
+          </a:bodyPr>
+          <a:lstStyle/>
+          <a:p>
+            <a:r>
+              <a:rPr lang="en-US" sz="1400" b="1" kern="0" dirty="0" smtClean="0">
+                <a:solidFill>
+                  <a:sysClr val="windowText" lastClr="000000"/>
+                </a:solidFill>
+              </a:rPr>
+              <a:t>Big </a:t>
+            </a:r>
+            <a:r>
+              <a:rPr lang="en-US" sz="1400" b="1" kern="0" dirty="0">
+                <a:solidFill>
+                  <a:sysClr val="windowText" lastClr="000000"/>
+                </a:solidFill>
+              </a:rPr>
+              <a:t>Data Framework Provider</a:t>
+            </a:r>
+          </a:p>
+        </p:txBody>
+      </p:sp>
+      <p:sp>
+        <p:nvSpPr>
+          <p:cNvPr id="156" name="TextBox 155"/>
+          <p:cNvSpPr txBox="1"/>
+          <p:nvPr/>
+        </p:nvSpPr>
+        <p:spPr>
+          <a:xfrm>
+            <a:off x="3532047" y="3333729"/>
+            <a:ext cx="4550890" cy="276999"/>
+          </a:xfrm>
+          <a:prstGeom prst="rect">
+            <a:avLst/>
+          </a:prstGeom>
+          <a:noFill/>
+        </p:spPr>
+        <p:txBody>
+          <a:bodyPr wrap="square" rtlCol="0">
+            <a:spAutoFit/>
+          </a:bodyPr>
+          <a:lstStyle/>
+          <a:p>
+            <a:r>
+              <a:rPr lang="en-US" sz="1200" b="1" kern="0" dirty="0" smtClean="0">
+                <a:solidFill>
+                  <a:sysClr val="windowText" lastClr="000000"/>
+                </a:solidFill>
+              </a:rPr>
+              <a:t>Processing</a:t>
+            </a:r>
+            <a:r>
+              <a:rPr lang="en-US" sz="1200" b="1" kern="0" dirty="0">
+                <a:solidFill>
+                  <a:sysClr val="windowText" lastClr="000000"/>
+                </a:solidFill>
+              </a:rPr>
+              <a:t>: Computing and Analytic</a:t>
+            </a:r>
+          </a:p>
+        </p:txBody>
+      </p:sp>
+      <p:sp>
+        <p:nvSpPr>
+          <p:cNvPr id="79" name="TextBox 78"/>
+          <p:cNvSpPr txBox="1"/>
+          <p:nvPr/>
+        </p:nvSpPr>
+        <p:spPr>
+          <a:xfrm>
+            <a:off x="3467782" y="4129534"/>
+            <a:ext cx="4914218" cy="276999"/>
+          </a:xfrm>
+          <a:prstGeom prst="rect">
+            <a:avLst/>
+          </a:prstGeom>
+          <a:noFill/>
+        </p:spPr>
+        <p:txBody>
+          <a:bodyPr wrap="square" rtlCol="0">
+            <a:spAutoFit/>
+          </a:bodyPr>
+          <a:lstStyle/>
+          <a:p>
+            <a:r>
+              <a:rPr lang="en-US" sz="1200" b="1" kern="0" dirty="0" smtClean="0">
+                <a:solidFill>
+                  <a:sysClr val="windowText" lastClr="000000"/>
+                </a:solidFill>
+              </a:rPr>
+              <a:t>Platforms</a:t>
+            </a:r>
+            <a:r>
+              <a:rPr lang="en-US" sz="1200" b="1" kern="0" dirty="0">
+                <a:solidFill>
+                  <a:sysClr val="windowText" lastClr="000000"/>
+                </a:solidFill>
+              </a:rPr>
+              <a:t>: Data Organization and Distribution </a:t>
+            </a:r>
+          </a:p>
+        </p:txBody>
+      </p:sp>
+      <p:sp>
+        <p:nvSpPr>
+          <p:cNvPr id="80" name="TextBox 79"/>
+          <p:cNvSpPr txBox="1"/>
+          <p:nvPr/>
+        </p:nvSpPr>
+        <p:spPr>
+          <a:xfrm>
+            <a:off x="3517609" y="4838067"/>
+            <a:ext cx="4565328" cy="276999"/>
+          </a:xfrm>
+          <a:prstGeom prst="rect">
+            <a:avLst/>
+          </a:prstGeom>
+          <a:noFill/>
+        </p:spPr>
+        <p:txBody>
+          <a:bodyPr wrap="square" rtlCol="0">
+            <a:spAutoFit/>
+          </a:bodyPr>
+          <a:lstStyle/>
+          <a:p>
+            <a:r>
+              <a:rPr lang="en-US" sz="1200" b="1" kern="0" dirty="0" smtClean="0">
+                <a:solidFill>
+                  <a:sysClr val="windowText" lastClr="000000"/>
+                </a:solidFill>
+              </a:rPr>
+              <a:t>Infrastructures</a:t>
+            </a:r>
+            <a:r>
+              <a:rPr lang="en-US" sz="1200" b="1" kern="0" dirty="0">
+                <a:solidFill>
+                  <a:sysClr val="windowText" lastClr="000000"/>
+                </a:solidFill>
+              </a:rPr>
+              <a:t>: Networking, Computing, Storage</a:t>
+            </a:r>
+          </a:p>
+        </p:txBody>
+      </p:sp>
+      <p:cxnSp>
+        <p:nvCxnSpPr>
+          <p:cNvPr id="154" name="Straight Arrow Connector 153"/>
+          <p:cNvCxnSpPr>
+            <a:stCxn id="109" idx="2"/>
+          </p:cNvCxnSpPr>
+          <p:nvPr/>
+        </p:nvCxnSpPr>
+        <p:spPr>
+          <a:xfrm>
+            <a:off x="5730039" y="2629665"/>
+            <a:ext cx="0" cy="432473"/>
+          </a:xfrm>
+          <a:prstGeom prst="straightConnector1">
+            <a:avLst/>
+          </a:prstGeom>
+          <a:ln w="41275">
+            <a:solidFill>
+              <a:srgbClr val="006600"/>
+            </a:solidFill>
+            <a:tailEnd type="triangle"/>
+          </a:ln>
+        </p:spPr>
+        <p:style>
+          <a:lnRef idx="1">
+            <a:schemeClr val="accent1"/>
+          </a:lnRef>
+          <a:fillRef idx="0">
+            <a:schemeClr val="accent1"/>
+          </a:fillRef>
+          <a:effectRef idx="0">
+            <a:schemeClr val="accent1"/>
+          </a:effectRef>
+          <a:fontRef idx="minor">
+            <a:schemeClr val="tx1"/>
+          </a:fontRef>
+        </p:style>
+      </p:cxnSp>
+      <p:sp>
+        <p:nvSpPr>
+          <p:cNvPr id="163" name="Left-Right Arrow 162"/>
+          <p:cNvSpPr/>
+          <p:nvPr/>
+        </p:nvSpPr>
+        <p:spPr>
+          <a:xfrm rot="16200000">
+            <a:off x="5764822" y="2716821"/>
+            <a:ext cx="419531" cy="242826"/>
+          </a:xfrm>
+          <a:prstGeom prst="leftRightArrow">
+            <a:avLst/>
+          </a:prstGeom>
+          <a:solidFill>
+            <a:schemeClr val="accent1"/>
+          </a:solidFill>
+          <a:ln>
+            <a:noFill/>
+          </a:ln>
+          <a:effectLst>
+            <a:outerShdw blurRad="50800" dist="38100" dir="2700000" algn="tl" rotWithShape="0">
+              <a:prstClr val="black">
+                <a:alpha val="40000"/>
+              </a:prstClr>
+            </a:outerShdw>
+          </a:effectLst>
+        </p:spPr>
+        <p:style>
+          <a:lnRef idx="2">
+            <a:schemeClr val="accent1">
+              <a:shade val="50000"/>
+            </a:schemeClr>
+          </a:lnRef>
+          <a:fillRef idx="1">
+            <a:schemeClr val="accent1"/>
+          </a:fillRef>
+          <a:effectRef idx="0">
+            <a:schemeClr val="accent1"/>
+          </a:effectRef>
+          <a:fontRef idx="minor">
+            <a:schemeClr val="lt1"/>
+          </a:fontRef>
+        </p:style>
+        <p:txBody>
+          <a:bodyPr lIns="0" tIns="0" rIns="0" bIns="0" rtlCol="0" anchor="ctr"/>
+          <a:lstStyle/>
+          <a:p>
+            <a:pPr algn="ctr"/>
+            <a:r>
+              <a:rPr lang="en-US" sz="900" b="1" kern="0" spc="50" dirty="0">
+                <a:solidFill>
+                  <a:sysClr val="windowText" lastClr="000000"/>
+                </a:solidFill>
+              </a:rPr>
+              <a:t>DATA</a:t>
+            </a:r>
+          </a:p>
+        </p:txBody>
+      </p:sp>
+      <p:sp>
+        <p:nvSpPr>
+          <p:cNvPr id="167" name="Down Arrow 166"/>
+          <p:cNvSpPr/>
+          <p:nvPr/>
+        </p:nvSpPr>
+        <p:spPr>
+          <a:xfrm>
+            <a:off x="6155012" y="2625000"/>
+            <a:ext cx="245788" cy="451327"/>
+          </a:xfrm>
+          <a:prstGeom prst="downArrow">
+            <a:avLst/>
+          </a:prstGeom>
+          <a:solidFill>
+            <a:srgbClr val="FF0000"/>
+          </a:solidFill>
+          <a:ln>
+            <a:noFill/>
+          </a:ln>
+        </p:spPr>
+        <p:style>
+          <a:lnRef idx="2">
+            <a:schemeClr val="accent1">
+              <a:shade val="50000"/>
+            </a:schemeClr>
+          </a:lnRef>
+          <a:fillRef idx="1">
+            <a:schemeClr val="accent1"/>
+          </a:fillRef>
+          <a:effectRef idx="0">
+            <a:schemeClr val="accent1"/>
+          </a:effectRef>
+          <a:fontRef idx="minor">
+            <a:schemeClr val="lt1"/>
+          </a:fontRef>
+        </p:style>
+        <p:txBody>
+          <a:bodyPr vert="vert270" rtlCol="0" anchor="ctr"/>
+          <a:lstStyle/>
+          <a:p>
+            <a:pPr algn="ctr"/>
+            <a:r>
+              <a:rPr lang="en-US" sz="1050" b="1" kern="0" dirty="0">
+                <a:solidFill>
+                  <a:sysClr val="windowText" lastClr="000000"/>
+                </a:solidFill>
+              </a:rPr>
+              <a:t>SW</a:t>
+            </a:r>
+          </a:p>
+        </p:txBody>
+      </p:sp>
+      <p:sp>
+        <p:nvSpPr>
+          <p:cNvPr id="117" name="Rounded Rectangle 116"/>
+          <p:cNvSpPr/>
+          <p:nvPr/>
+        </p:nvSpPr>
+        <p:spPr>
+          <a:xfrm flipH="1">
+            <a:off x="4241918" y="1922775"/>
+            <a:ext cx="939677" cy="594783"/>
+          </a:xfrm>
+          <a:prstGeom prst="roundRect">
+            <a:avLst/>
+          </a:prstGeom>
+          <a:solidFill>
+            <a:schemeClr val="accent4">
+              <a:lumMod val="20000"/>
+              <a:lumOff val="80000"/>
+            </a:schemeClr>
+          </a:solidFill>
+          <a:ln>
+            <a:noFill/>
+          </a:ln>
+          <a:effectLst>
+            <a:outerShdw blurRad="50800" dist="38100" dir="2700000" algn="tl" rotWithShape="0">
+              <a:prstClr val="black">
+                <a:alpha val="40000"/>
+              </a:prstClr>
+            </a:outerShdw>
+          </a:effectLst>
+        </p:spPr>
+        <p:style>
+          <a:lnRef idx="2">
+            <a:schemeClr val="accent1">
+              <a:shade val="50000"/>
+            </a:schemeClr>
+          </a:lnRef>
+          <a:fillRef idx="1">
+            <a:schemeClr val="accent1"/>
+          </a:fillRef>
+          <a:effectRef idx="0">
+            <a:schemeClr val="accent1"/>
+          </a:effectRef>
+          <a:fontRef idx="minor">
+            <a:schemeClr val="lt1"/>
+          </a:fontRef>
+        </p:style>
+        <p:txBody>
+          <a:bodyPr lIns="0" rIns="0" rtlCol="0" anchor="b" anchorCtr="1"/>
+          <a:lstStyle/>
+          <a:p>
+            <a:pPr algn="r"/>
+            <a:r>
+              <a:rPr lang="en-US" sz="1400" b="1" kern="0" dirty="0">
+                <a:solidFill>
+                  <a:schemeClr val="tx1"/>
+                </a:solidFill>
+              </a:rPr>
+              <a:t>Preparation/ Curation</a:t>
+            </a:r>
+          </a:p>
+        </p:txBody>
+      </p:sp>
+      <p:sp>
+        <p:nvSpPr>
+          <p:cNvPr id="81" name="Rounded Rectangle 80"/>
+          <p:cNvSpPr/>
+          <p:nvPr/>
+        </p:nvSpPr>
+        <p:spPr>
+          <a:xfrm flipH="1">
+            <a:off x="2984994" y="3431719"/>
+            <a:ext cx="344746" cy="2072732"/>
+          </a:xfrm>
+          <a:prstGeom prst="roundRect">
+            <a:avLst/>
+          </a:prstGeom>
+          <a:solidFill>
+            <a:schemeClr val="bg1">
+              <a:lumMod val="65000"/>
+            </a:schemeClr>
+          </a:solidFill>
+          <a:ln>
+            <a:noFill/>
+          </a:ln>
+          <a:effectLst>
+            <a:outerShdw blurRad="50800" dist="50800" dir="5400000" algn="ctr" rotWithShape="0">
+              <a:schemeClr val="tx1">
+                <a:lumMod val="50000"/>
+                <a:lumOff val="50000"/>
+              </a:schemeClr>
+            </a:outerShdw>
+          </a:effectLst>
+        </p:spPr>
+        <p:style>
+          <a:lnRef idx="2">
+            <a:schemeClr val="accent1">
+              <a:shade val="50000"/>
+            </a:schemeClr>
+          </a:lnRef>
+          <a:fillRef idx="1">
+            <a:schemeClr val="accent1"/>
+          </a:fillRef>
+          <a:effectRef idx="0">
+            <a:schemeClr val="accent1"/>
+          </a:effectRef>
+          <a:fontRef idx="minor">
+            <a:schemeClr val="lt1"/>
+          </a:fontRef>
+        </p:style>
+        <p:txBody>
+          <a:bodyPr vert="vert270" rtlCol="0" anchor="ctr"/>
+          <a:lstStyle/>
+          <a:p>
+            <a:pPr algn="ctr"/>
+            <a:r>
+              <a:rPr lang="en-US" sz="1200" b="1" kern="0" dirty="0" smtClean="0">
+                <a:solidFill>
+                  <a:schemeClr val="tx1"/>
+                </a:solidFill>
+              </a:rPr>
+              <a:t>Messaging</a:t>
+            </a:r>
+            <a:r>
+              <a:rPr lang="en-US" sz="1200" b="1" kern="0" dirty="0">
+                <a:solidFill>
+                  <a:schemeClr val="tx1"/>
+                </a:solidFill>
+              </a:rPr>
+              <a:t>/ Communications</a:t>
+            </a:r>
+          </a:p>
+        </p:txBody>
+      </p:sp>
+      <p:sp>
+        <p:nvSpPr>
+          <p:cNvPr id="71" name="Rounded Rectangle 70"/>
+          <p:cNvSpPr/>
+          <p:nvPr/>
+        </p:nvSpPr>
+        <p:spPr>
+          <a:xfrm flipH="1">
+            <a:off x="8169948" y="3400991"/>
+            <a:ext cx="385798" cy="2168808"/>
+          </a:xfrm>
+          <a:prstGeom prst="roundRect">
+            <a:avLst/>
+          </a:prstGeom>
+          <a:solidFill>
+            <a:schemeClr val="bg1">
+              <a:lumMod val="65000"/>
+            </a:schemeClr>
+          </a:solidFill>
+          <a:ln>
+            <a:noFill/>
+          </a:ln>
+          <a:effectLst>
+            <a:outerShdw blurRad="50800" dist="50800" dir="5400000" algn="ctr" rotWithShape="0">
+              <a:schemeClr val="tx1">
+                <a:lumMod val="50000"/>
+                <a:lumOff val="50000"/>
+              </a:schemeClr>
+            </a:outerShdw>
+          </a:effectLst>
+        </p:spPr>
+        <p:style>
+          <a:lnRef idx="2">
+            <a:schemeClr val="accent1">
+              <a:shade val="50000"/>
+            </a:schemeClr>
+          </a:lnRef>
+          <a:fillRef idx="1">
+            <a:schemeClr val="accent1"/>
+          </a:fillRef>
+          <a:effectRef idx="0">
+            <a:schemeClr val="accent1"/>
+          </a:effectRef>
+          <a:fontRef idx="minor">
+            <a:schemeClr val="lt1"/>
+          </a:fontRef>
+        </p:style>
+        <p:txBody>
+          <a:bodyPr vert="vert270" rtlCol="0" anchor="ctr"/>
+          <a:lstStyle/>
+          <a:p>
+            <a:pPr algn="ctr"/>
+            <a:r>
+              <a:rPr lang="en-US" sz="1200" b="1" kern="0" dirty="0" smtClean="0">
+                <a:solidFill>
+                  <a:schemeClr val="tx1"/>
+                </a:solidFill>
+              </a:rPr>
+              <a:t>Resource </a:t>
+            </a:r>
+            <a:r>
+              <a:rPr lang="en-US" sz="1200" b="1" kern="0" dirty="0">
+                <a:solidFill>
+                  <a:schemeClr val="tx1"/>
+                </a:solidFill>
+              </a:rPr>
+              <a:t>Management</a:t>
+            </a:r>
+          </a:p>
+        </p:txBody>
+      </p:sp>
+      <p:sp>
+        <p:nvSpPr>
+          <p:cNvPr id="83" name="Rounded Rectangle 82"/>
+          <p:cNvSpPr/>
+          <p:nvPr/>
+        </p:nvSpPr>
+        <p:spPr>
+          <a:xfrm flipH="1">
+            <a:off x="3532046" y="3581400"/>
+            <a:ext cx="4419599" cy="429037"/>
+          </a:xfrm>
+          <a:prstGeom prst="roundRect">
+            <a:avLst/>
+          </a:prstGeom>
+          <a:gradFill flip="none" rotWithShape="1">
+            <a:gsLst>
+              <a:gs pos="0">
+                <a:srgbClr val="00B050"/>
+              </a:gs>
+              <a:gs pos="50000">
+                <a:srgbClr val="FFFF00">
+                  <a:lumMod val="40000"/>
+                  <a:lumOff val="60000"/>
+                </a:srgbClr>
+              </a:gs>
+              <a:gs pos="100000">
+                <a:srgbClr val="FF0000"/>
+              </a:gs>
+            </a:gsLst>
+            <a:lin ang="0" scaled="1"/>
+            <a:tileRect/>
+          </a:gradFill>
+          <a:ln>
+            <a:solidFill>
+              <a:srgbClr val="E3B5B3"/>
+            </a:solidFill>
+          </a:ln>
+        </p:spPr>
+        <p:style>
+          <a:lnRef idx="2">
+            <a:schemeClr val="accent1">
+              <a:shade val="50000"/>
+            </a:schemeClr>
+          </a:lnRef>
+          <a:fillRef idx="1">
+            <a:schemeClr val="accent1"/>
+          </a:fillRef>
+          <a:effectRef idx="0">
+            <a:schemeClr val="accent1"/>
+          </a:effectRef>
+          <a:fontRef idx="minor">
+            <a:schemeClr val="lt1"/>
+          </a:fontRef>
+        </p:style>
+        <p:txBody>
+          <a:bodyPr rtlCol="0" anchor="ctr"/>
+          <a:lstStyle/>
+          <a:p>
+            <a:r>
+              <a:rPr lang="en-US" sz="1200" b="1" kern="0" dirty="0">
+                <a:solidFill>
+                  <a:schemeClr val="tx1"/>
+                </a:solidFill>
+              </a:rPr>
+              <a:t>Batch</a:t>
+            </a:r>
+            <a:endParaRPr lang="en-US" sz="2000" b="1" kern="0" dirty="0">
+              <a:solidFill>
+                <a:schemeClr val="tx1"/>
+              </a:solidFill>
+            </a:endParaRPr>
+          </a:p>
+        </p:txBody>
+      </p:sp>
+      <p:sp>
+        <p:nvSpPr>
+          <p:cNvPr id="4" name="TextBox 3"/>
+          <p:cNvSpPr txBox="1"/>
+          <p:nvPr/>
+        </p:nvSpPr>
+        <p:spPr>
+          <a:xfrm>
+            <a:off x="6953496" y="3642029"/>
+            <a:ext cx="944105" cy="307777"/>
+          </a:xfrm>
+          <a:prstGeom prst="rect">
+            <a:avLst/>
+          </a:prstGeom>
+          <a:noFill/>
+        </p:spPr>
+        <p:txBody>
+          <a:bodyPr wrap="none" rtlCol="0">
+            <a:spAutoFit/>
+          </a:bodyPr>
+          <a:lstStyle/>
+          <a:p>
+            <a:r>
+              <a:rPr lang="en-US" sz="1400" b="1" kern="0" dirty="0">
+                <a:solidFill>
+                  <a:sysClr val="windowText" lastClr="000000"/>
+                </a:solidFill>
+              </a:rPr>
+              <a:t>Streaming</a:t>
+            </a:r>
+          </a:p>
+        </p:txBody>
+      </p:sp>
+      <p:sp>
+        <p:nvSpPr>
+          <p:cNvPr id="82" name="TextBox 81"/>
+          <p:cNvSpPr txBox="1"/>
+          <p:nvPr/>
+        </p:nvSpPr>
+        <p:spPr>
+          <a:xfrm>
+            <a:off x="5131453" y="3648228"/>
+            <a:ext cx="981487" cy="307777"/>
+          </a:xfrm>
+          <a:prstGeom prst="rect">
+            <a:avLst/>
+          </a:prstGeom>
+          <a:noFill/>
+        </p:spPr>
+        <p:txBody>
+          <a:bodyPr wrap="none" rtlCol="0">
+            <a:spAutoFit/>
+          </a:bodyPr>
+          <a:lstStyle/>
+          <a:p>
+            <a:r>
+              <a:rPr lang="en-US" sz="1400" b="1" kern="0" dirty="0">
+                <a:solidFill>
+                  <a:sysClr val="windowText" lastClr="000000"/>
+                </a:solidFill>
+              </a:rPr>
+              <a:t>Interactive</a:t>
+            </a:r>
+          </a:p>
+        </p:txBody>
+      </p:sp>
+    </p:spTree>
+    <p:extLst>
+      <p:ext uri="{BB962C8B-B14F-4D97-AF65-F5344CB8AC3E}">
+        <p14:creationId xmlns:p14="http://schemas.microsoft.com/office/powerpoint/2010/main" val="1835751879"/>
       </p:ext>
     </p:extLst>
   </p:cSld>

</xml_diff>